<commit_message>
add new version tutorial
</commit_message>
<xml_diff>
--- a/2048_project_tutorial.pptx
+++ b/2048_project_tutorial.pptx
@@ -6,33 +6,34 @@
   </p:sldMasterIdLst>
   <p:sldIdLst>
     <p:sldId id="256" r:id="rId2"/>
-    <p:sldId id="257" r:id="rId3"/>
-    <p:sldId id="258" r:id="rId4"/>
-    <p:sldId id="260" r:id="rId5"/>
-    <p:sldId id="262" r:id="rId6"/>
-    <p:sldId id="264" r:id="rId7"/>
-    <p:sldId id="266" r:id="rId8"/>
-    <p:sldId id="267" r:id="rId9"/>
-    <p:sldId id="268" r:id="rId10"/>
-    <p:sldId id="269" r:id="rId11"/>
-    <p:sldId id="270" r:id="rId12"/>
-    <p:sldId id="271" r:id="rId13"/>
-    <p:sldId id="273" r:id="rId14"/>
-    <p:sldId id="274" r:id="rId15"/>
-    <p:sldId id="275" r:id="rId16"/>
-    <p:sldId id="278" r:id="rId17"/>
-    <p:sldId id="276" r:id="rId18"/>
-    <p:sldId id="279" r:id="rId19"/>
-    <p:sldId id="281" r:id="rId20"/>
-    <p:sldId id="282" r:id="rId21"/>
-    <p:sldId id="283" r:id="rId22"/>
-    <p:sldId id="284" r:id="rId23"/>
-    <p:sldId id="285" r:id="rId24"/>
-    <p:sldId id="286" r:id="rId25"/>
-    <p:sldId id="287" r:id="rId26"/>
-    <p:sldId id="289" r:id="rId27"/>
-    <p:sldId id="290" r:id="rId28"/>
-    <p:sldId id="291" r:id="rId29"/>
+    <p:sldId id="293" r:id="rId3"/>
+    <p:sldId id="257" r:id="rId4"/>
+    <p:sldId id="258" r:id="rId5"/>
+    <p:sldId id="260" r:id="rId6"/>
+    <p:sldId id="262" r:id="rId7"/>
+    <p:sldId id="264" r:id="rId8"/>
+    <p:sldId id="266" r:id="rId9"/>
+    <p:sldId id="267" r:id="rId10"/>
+    <p:sldId id="268" r:id="rId11"/>
+    <p:sldId id="269" r:id="rId12"/>
+    <p:sldId id="270" r:id="rId13"/>
+    <p:sldId id="271" r:id="rId14"/>
+    <p:sldId id="273" r:id="rId15"/>
+    <p:sldId id="274" r:id="rId16"/>
+    <p:sldId id="275" r:id="rId17"/>
+    <p:sldId id="278" r:id="rId18"/>
+    <p:sldId id="286" r:id="rId19"/>
+    <p:sldId id="276" r:id="rId20"/>
+    <p:sldId id="279" r:id="rId21"/>
+    <p:sldId id="281" r:id="rId22"/>
+    <p:sldId id="282" r:id="rId23"/>
+    <p:sldId id="283" r:id="rId24"/>
+    <p:sldId id="284" r:id="rId25"/>
+    <p:sldId id="285" r:id="rId26"/>
+    <p:sldId id="287" r:id="rId27"/>
+    <p:sldId id="289" r:id="rId28"/>
+    <p:sldId id="290" r:id="rId29"/>
+    <p:sldId id="291" r:id="rId30"/>
   </p:sldIdLst>
   <p:sldSz cx="12192000" cy="6858000"/>
   <p:notesSz cx="6858000" cy="9144000"/>
@@ -9273,6 +9274,116 @@
         </p:nvSpPr>
         <p:spPr>
           <a:xfrm>
+            <a:off x="1720468" y="2323405"/>
+            <a:ext cx="8858048" cy="1200329"/>
+          </a:xfrm>
+          <a:prstGeom prst="rect">
+            <a:avLst/>
+          </a:prstGeom>
+          <a:noFill/>
+        </p:spPr>
+        <p:txBody>
+          <a:bodyPr wrap="square" rtlCol="0">
+            <a:spAutoFit/>
+          </a:bodyPr>
+          <a:lstStyle/>
+          <a:p>
+            <a:r>
+              <a:rPr lang="en-US" sz="2400" dirty="0">
+                <a:latin typeface="Adobe Fan Heiti Std B" panose="020B0700000000000000" pitchFamily="34" charset="-128"/>
+                <a:ea typeface="Adobe Fan Heiti Std B" panose="020B0700000000000000" pitchFamily="34" charset="-128"/>
+              </a:rPr>
+              <a:t>Step 5:  The logic of the game is implemented in this class. Due to limited time, if you are interested in game logic, you can look at the code.</a:t>
+            </a:r>
+          </a:p>
+        </p:txBody>
+      </p:sp>
+    </p:spTree>
+    <p:extLst>
+      <p:ext uri="{BB962C8B-B14F-4D97-AF65-F5344CB8AC3E}">
+        <p14:creationId xmlns:p14="http://schemas.microsoft.com/office/powerpoint/2010/main" val="3170536687"/>
+      </p:ext>
+    </p:extLst>
+  </p:cSld>
+  <p:clrMapOvr>
+    <a:masterClrMapping/>
+  </p:clrMapOvr>
+</p:sld>
+</file>
+
+<file path=ppt/slides/slide11.xml><?xml version="1.0" encoding="utf-8"?>
+<p:sld xmlns:a="http://schemas.openxmlformats.org/drawingml/2006/main" xmlns:r="http://schemas.openxmlformats.org/officeDocument/2006/relationships" xmlns:p="http://schemas.openxmlformats.org/presentationml/2006/main">
+  <p:cSld>
+    <p:spTree>
+      <p:nvGrpSpPr>
+        <p:cNvPr id="1" name=""/>
+        <p:cNvGrpSpPr/>
+        <p:nvPr/>
+      </p:nvGrpSpPr>
+      <p:grpSpPr>
+        <a:xfrm>
+          <a:off x="0" y="0"/>
+          <a:ext cx="0" cy="0"/>
+          <a:chOff x="0" y="0"/>
+          <a:chExt cx="0" cy="0"/>
+        </a:xfrm>
+      </p:grpSpPr>
+      <p:sp>
+        <p:nvSpPr>
+          <p:cNvPr id="2" name="Title 1">
+            <a:extLst>
+              <a:ext uri="{FF2B5EF4-FFF2-40B4-BE49-F238E27FC236}">
+                <a16:creationId xmlns:a16="http://schemas.microsoft.com/office/drawing/2014/main" id="{FDE5CA10-4382-4FBE-8743-226E74A3B3CA}"/>
+              </a:ext>
+            </a:extLst>
+          </p:cNvPr>
+          <p:cNvSpPr>
+            <a:spLocks noGrp="1"/>
+          </p:cNvSpPr>
+          <p:nvPr>
+            <p:ph type="title"/>
+          </p:nvPr>
+        </p:nvSpPr>
+        <p:spPr>
+          <a:xfrm>
+            <a:off x="1720469" y="606986"/>
+            <a:ext cx="9061010" cy="726519"/>
+          </a:xfrm>
+        </p:spPr>
+        <p:txBody>
+          <a:bodyPr>
+            <a:normAutofit/>
+          </a:bodyPr>
+          <a:lstStyle/>
+          <a:p>
+            <a:r>
+              <a:rPr lang="en-US" dirty="0" err="1">
+                <a:latin typeface="Adobe Gothic Std B" panose="020B0800000000000000" pitchFamily="34" charset="-128"/>
+                <a:ea typeface="Adobe Gothic Std B" panose="020B0800000000000000" pitchFamily="34" charset="-128"/>
+              </a:rPr>
+              <a:t>GridLayout</a:t>
+            </a:r>
+            <a:endParaRPr lang="en-US" dirty="0">
+              <a:latin typeface="Adobe Gothic Std B" panose="020B0800000000000000" pitchFamily="34" charset="-128"/>
+              <a:ea typeface="Adobe Gothic Std B" panose="020B0800000000000000" pitchFamily="34" charset="-128"/>
+            </a:endParaRPr>
+          </a:p>
+        </p:txBody>
+      </p:sp>
+      <p:sp>
+        <p:nvSpPr>
+          <p:cNvPr id="5" name="TextBox 4">
+            <a:extLst>
+              <a:ext uri="{FF2B5EF4-FFF2-40B4-BE49-F238E27FC236}">
+                <a16:creationId xmlns:a16="http://schemas.microsoft.com/office/drawing/2014/main" id="{4EF13458-918B-479C-9167-62849C1FAA87}"/>
+              </a:ext>
+            </a:extLst>
+          </p:cNvPr>
+          <p:cNvSpPr txBox="1"/>
+          <p:nvPr/>
+        </p:nvSpPr>
+        <p:spPr>
+          <a:xfrm>
             <a:off x="1720469" y="1333505"/>
             <a:ext cx="8858048" cy="830997"/>
           </a:xfrm>
@@ -9306,7 +9417,7 @@
                 <a:latin typeface="Adobe Fan Heiti Std B" panose="020B0700000000000000" pitchFamily="34" charset="-128"/>
                 <a:ea typeface="Adobe Fan Heiti Std B" panose="020B0700000000000000" pitchFamily="34" charset="-128"/>
               </a:rPr>
-              <a:t> file in order to setting the radius and background color</a:t>
+              <a:t> folder in order to setting the radius and background color</a:t>
             </a:r>
           </a:p>
         </p:txBody>
@@ -9354,7 +9465,7 @@
 </p:sld>
 </file>
 
-<file path=ppt/slides/slide11.xml><?xml version="1.0" encoding="utf-8"?>
+<file path=ppt/slides/slide12.xml><?xml version="1.0" encoding="utf-8"?>
 <p:sld xmlns:a="http://schemas.openxmlformats.org/drawingml/2006/main" xmlns:r="http://schemas.openxmlformats.org/officeDocument/2006/relationships" xmlns:p="http://schemas.openxmlformats.org/presentationml/2006/main">
   <p:cSld>
     <p:spTree>
@@ -9613,7 +9724,7 @@
 </p:sld>
 </file>
 
-<file path=ppt/slides/slide12.xml><?xml version="1.0" encoding="utf-8"?>
+<file path=ppt/slides/slide13.xml><?xml version="1.0" encoding="utf-8"?>
 <p:sld xmlns:a="http://schemas.openxmlformats.org/drawingml/2006/main" xmlns:r="http://schemas.openxmlformats.org/officeDocument/2006/relationships" xmlns:p="http://schemas.openxmlformats.org/presentationml/2006/main">
   <p:cSld>
     <p:spTree>
@@ -9746,166 +9857,6 @@
     <p:extLst>
       <p:ext uri="{BB962C8B-B14F-4D97-AF65-F5344CB8AC3E}">
         <p14:creationId xmlns:p14="http://schemas.microsoft.com/office/powerpoint/2010/main" val="2144231945"/>
-      </p:ext>
-    </p:extLst>
-  </p:cSld>
-  <p:clrMapOvr>
-    <a:masterClrMapping/>
-  </p:clrMapOvr>
-</p:sld>
-</file>
-
-<file path=ppt/slides/slide13.xml><?xml version="1.0" encoding="utf-8"?>
-<p:sld xmlns:a="http://schemas.openxmlformats.org/drawingml/2006/main" xmlns:r="http://schemas.openxmlformats.org/officeDocument/2006/relationships" xmlns:p="http://schemas.openxmlformats.org/presentationml/2006/main">
-  <p:cSld>
-    <p:spTree>
-      <p:nvGrpSpPr>
-        <p:cNvPr id="1" name=""/>
-        <p:cNvGrpSpPr/>
-        <p:nvPr/>
-      </p:nvGrpSpPr>
-      <p:grpSpPr>
-        <a:xfrm>
-          <a:off x="0" y="0"/>
-          <a:ext cx="0" cy="0"/>
-          <a:chOff x="0" y="0"/>
-          <a:chExt cx="0" cy="0"/>
-        </a:xfrm>
-      </p:grpSpPr>
-      <p:sp>
-        <p:nvSpPr>
-          <p:cNvPr id="2" name="Title 1">
-            <a:extLst>
-              <a:ext uri="{FF2B5EF4-FFF2-40B4-BE49-F238E27FC236}">
-                <a16:creationId xmlns:a16="http://schemas.microsoft.com/office/drawing/2014/main" id="{FDE5CA10-4382-4FBE-8743-226E74A3B3CA}"/>
-              </a:ext>
-            </a:extLst>
-          </p:cNvPr>
-          <p:cNvSpPr>
-            <a:spLocks noGrp="1"/>
-          </p:cNvSpPr>
-          <p:nvPr>
-            <p:ph type="title"/>
-          </p:nvPr>
-        </p:nvSpPr>
-        <p:spPr>
-          <a:xfrm>
-            <a:off x="1720469" y="606986"/>
-            <a:ext cx="9061010" cy="726519"/>
-          </a:xfrm>
-        </p:spPr>
-        <p:txBody>
-          <a:bodyPr>
-            <a:normAutofit/>
-          </a:bodyPr>
-          <a:lstStyle/>
-          <a:p>
-            <a:r>
-              <a:rPr lang="en-US" dirty="0" err="1">
-                <a:latin typeface="Adobe Gothic Std B" panose="020B0800000000000000" pitchFamily="34" charset="-128"/>
-                <a:ea typeface="Adobe Gothic Std B" panose="020B0800000000000000" pitchFamily="34" charset="-128"/>
-              </a:rPr>
-              <a:t>FrameLayout</a:t>
-            </a:r>
-            <a:endParaRPr lang="en-US" dirty="0">
-              <a:latin typeface="Adobe Gothic Std B" panose="020B0800000000000000" pitchFamily="34" charset="-128"/>
-              <a:ea typeface="Adobe Gothic Std B" panose="020B0800000000000000" pitchFamily="34" charset="-128"/>
-            </a:endParaRPr>
-          </a:p>
-        </p:txBody>
-      </p:sp>
-      <p:sp>
-        <p:nvSpPr>
-          <p:cNvPr id="5" name="TextBox 4">
-            <a:extLst>
-              <a:ext uri="{FF2B5EF4-FFF2-40B4-BE49-F238E27FC236}">
-                <a16:creationId xmlns:a16="http://schemas.microsoft.com/office/drawing/2014/main" id="{4EF13458-918B-479C-9167-62849C1FAA87}"/>
-              </a:ext>
-            </a:extLst>
-          </p:cNvPr>
-          <p:cNvSpPr txBox="1"/>
-          <p:nvPr/>
-        </p:nvSpPr>
-        <p:spPr>
-          <a:xfrm>
-            <a:off x="1720469" y="1333505"/>
-            <a:ext cx="8858048" cy="830997"/>
-          </a:xfrm>
-          <a:prstGeom prst="rect">
-            <a:avLst/>
-          </a:prstGeom>
-          <a:noFill/>
-        </p:spPr>
-        <p:txBody>
-          <a:bodyPr wrap="square" rtlCol="0">
-            <a:spAutoFit/>
-          </a:bodyPr>
-          <a:lstStyle/>
-          <a:p>
-            <a:r>
-              <a:rPr lang="en-US" sz="2400" dirty="0">
-                <a:latin typeface="Adobe Fan Heiti Std B" panose="020B0700000000000000" pitchFamily="34" charset="-128"/>
-                <a:ea typeface="Adobe Fan Heiti Std B" panose="020B0700000000000000" pitchFamily="34" charset="-128"/>
-              </a:rPr>
-              <a:t>Step 1: </a:t>
-            </a:r>
-            <a:r>
-              <a:rPr lang="en-US" sz="2400" dirty="0">
-                <a:latin typeface="Adobe Fan Heiti Std B" panose="020B0700000000000000" pitchFamily="34" charset="-128"/>
-                <a:ea typeface="Adobe Fan Heiti Std B" panose="020B0700000000000000" pitchFamily="34" charset="-128"/>
-                <a:cs typeface="Adobe Devanagari" panose="02040503050201020203" pitchFamily="18" charset="0"/>
-              </a:rPr>
-              <a:t>Customize my Card class which parent class is </a:t>
-            </a:r>
-            <a:r>
-              <a:rPr lang="en-US" sz="2400" dirty="0" err="1">
-                <a:latin typeface="Adobe Fan Heiti Std B" panose="020B0700000000000000" pitchFamily="34" charset="-128"/>
-                <a:ea typeface="Adobe Fan Heiti Std B" panose="020B0700000000000000" pitchFamily="34" charset="-128"/>
-                <a:cs typeface="Adobe Devanagari" panose="02040503050201020203" pitchFamily="18" charset="0"/>
-              </a:rPr>
-              <a:t>GridLayout</a:t>
-            </a:r>
-            <a:endParaRPr lang="en-US" sz="2400" dirty="0">
-              <a:latin typeface="Adobe Fan Heiti Std B" panose="020B0700000000000000" pitchFamily="34" charset="-128"/>
-              <a:ea typeface="Adobe Fan Heiti Std B" panose="020B0700000000000000" pitchFamily="34" charset="-128"/>
-            </a:endParaRPr>
-          </a:p>
-        </p:txBody>
-      </p:sp>
-      <p:pic>
-        <p:nvPicPr>
-          <p:cNvPr id="3" name="Picture 2">
-            <a:extLst>
-              <a:ext uri="{FF2B5EF4-FFF2-40B4-BE49-F238E27FC236}">
-                <a16:creationId xmlns:a16="http://schemas.microsoft.com/office/drawing/2014/main" id="{7E4FD021-F6E4-49EA-8EA9-F0603CBD8D25}"/>
-              </a:ext>
-            </a:extLst>
-          </p:cNvPr>
-          <p:cNvPicPr>
-            <a:picLocks noChangeAspect="1"/>
-          </p:cNvPicPr>
-          <p:nvPr/>
-        </p:nvPicPr>
-        <p:blipFill>
-          <a:blip r:embed="rId2"/>
-          <a:stretch>
-            <a:fillRect/>
-          </a:stretch>
-        </p:blipFill>
-        <p:spPr>
-          <a:xfrm>
-            <a:off x="1592423" y="2961837"/>
-            <a:ext cx="9556546" cy="1299769"/>
-          </a:xfrm>
-          <a:prstGeom prst="rect">
-            <a:avLst/>
-          </a:prstGeom>
-        </p:spPr>
-      </p:pic>
-    </p:spTree>
-    <p:extLst>
-      <p:ext uri="{BB962C8B-B14F-4D97-AF65-F5344CB8AC3E}">
-        <p14:creationId xmlns:p14="http://schemas.microsoft.com/office/powerpoint/2010/main" val="1523060745"/>
       </p:ext>
     </p:extLst>
   </p:cSld>
@@ -9989,7 +9940,7 @@
         <p:spPr>
           <a:xfrm>
             <a:off x="1720469" y="1333505"/>
-            <a:ext cx="8858048" cy="461665"/>
+            <a:ext cx="8858048" cy="830997"/>
           </a:xfrm>
           <a:prstGeom prst="rect">
             <a:avLst/>
@@ -10007,7 +9958,7 @@
                 <a:latin typeface="Adobe Fan Heiti Std B" panose="020B0700000000000000" pitchFamily="34" charset="-128"/>
                 <a:ea typeface="Adobe Fan Heiti Std B" panose="020B0700000000000000" pitchFamily="34" charset="-128"/>
               </a:rPr>
-              <a:t>Step 2: </a:t>
+              <a:t>Step 1: </a:t>
             </a:r>
             <a:r>
               <a:rPr lang="en-US" sz="2400" dirty="0">
@@ -10015,7 +9966,7 @@
                 <a:ea typeface="Adobe Fan Heiti Std B" panose="020B0700000000000000" pitchFamily="34" charset="-128"/>
                 <a:cs typeface="Adobe Devanagari" panose="02040503050201020203" pitchFamily="18" charset="0"/>
               </a:rPr>
-              <a:t>In the constructor, add </a:t>
+              <a:t>Customize my Card class which parent class is </a:t>
             </a:r>
             <a:r>
               <a:rPr lang="en-US" sz="2400" dirty="0" err="1">
@@ -10023,15 +9974,7 @@
                 <a:ea typeface="Adobe Fan Heiti Std B" panose="020B0700000000000000" pitchFamily="34" charset="-128"/>
                 <a:cs typeface="Adobe Devanagari" panose="02040503050201020203" pitchFamily="18" charset="0"/>
               </a:rPr>
-              <a:t>TextView</a:t>
-            </a:r>
-            <a:r>
-              <a:rPr lang="en-US" sz="2400" dirty="0">
-                <a:latin typeface="Adobe Fan Heiti Std B" panose="020B0700000000000000" pitchFamily="34" charset="-128"/>
-                <a:ea typeface="Adobe Fan Heiti Std B" panose="020B0700000000000000" pitchFamily="34" charset="-128"/>
-                <a:cs typeface="Adobe Devanagari" panose="02040503050201020203" pitchFamily="18" charset="0"/>
-              </a:rPr>
-              <a:t> to display the number </a:t>
+              <a:t>GridLayout</a:t>
             </a:r>
             <a:endParaRPr lang="en-US" sz="2400" dirty="0">
               <a:latin typeface="Adobe Fan Heiti Std B" panose="020B0700000000000000" pitchFamily="34" charset="-128"/>
@@ -10042,10 +9985,10 @@
       </p:sp>
       <p:pic>
         <p:nvPicPr>
-          <p:cNvPr id="4" name="Picture 3">
+          <p:cNvPr id="3" name="Picture 2">
             <a:extLst>
               <a:ext uri="{FF2B5EF4-FFF2-40B4-BE49-F238E27FC236}">
-                <a16:creationId xmlns:a16="http://schemas.microsoft.com/office/drawing/2014/main" id="{DFB7E347-4E60-4BFA-A747-CA4DC69F1DA4}"/>
+                <a16:creationId xmlns:a16="http://schemas.microsoft.com/office/drawing/2014/main" id="{7E4FD021-F6E4-49EA-8EA9-F0603CBD8D25}"/>
               </a:ext>
             </a:extLst>
           </p:cNvPr>
@@ -10062,82 +10005,18 @@
         </p:blipFill>
         <p:spPr>
           <a:xfrm>
-            <a:off x="1720469" y="1874115"/>
-            <a:ext cx="6970770" cy="3291303"/>
+            <a:off x="1592423" y="2961837"/>
+            <a:ext cx="9556546" cy="1299769"/>
           </a:xfrm>
           <a:prstGeom prst="rect">
             <a:avLst/>
           </a:prstGeom>
         </p:spPr>
       </p:pic>
-      <p:sp>
-        <p:nvSpPr>
-          <p:cNvPr id="6" name="TextBox 5">
-            <a:extLst>
-              <a:ext uri="{FF2B5EF4-FFF2-40B4-BE49-F238E27FC236}">
-                <a16:creationId xmlns:a16="http://schemas.microsoft.com/office/drawing/2014/main" id="{CCF968BA-D738-473C-9C77-C83410186B46}"/>
-              </a:ext>
-            </a:extLst>
-          </p:cNvPr>
-          <p:cNvSpPr txBox="1"/>
-          <p:nvPr/>
-        </p:nvSpPr>
-        <p:spPr>
-          <a:xfrm>
-            <a:off x="1720469" y="5417891"/>
-            <a:ext cx="9479902" cy="830997"/>
-          </a:xfrm>
-          <a:prstGeom prst="rect">
-            <a:avLst/>
-          </a:prstGeom>
-          <a:noFill/>
-        </p:spPr>
-        <p:txBody>
-          <a:bodyPr wrap="square" rtlCol="0">
-            <a:spAutoFit/>
-          </a:bodyPr>
-          <a:lstStyle/>
-          <a:p>
-            <a:r>
-              <a:rPr lang="en-US" sz="2400" dirty="0">
-                <a:solidFill>
-                  <a:schemeClr val="bg1">
-                    <a:lumMod val="50000"/>
-                  </a:schemeClr>
-                </a:solidFill>
-                <a:latin typeface="Adobe Fan Heiti Std B" panose="020B0700000000000000" pitchFamily="34" charset="-128"/>
-                <a:ea typeface="Adobe Fan Heiti Std B" panose="020B0700000000000000" pitchFamily="34" charset="-128"/>
-              </a:rPr>
-              <a:t>Tips: If you want the create a view in java code, you need to use the class - </a:t>
-            </a:r>
-            <a:r>
-              <a:rPr lang="en-US" sz="2400" dirty="0" err="1">
-                <a:solidFill>
-                  <a:schemeClr val="bg1">
-                    <a:lumMod val="50000"/>
-                  </a:schemeClr>
-                </a:solidFill>
-                <a:latin typeface="Adobe Fan Heiti Std B" panose="020B0700000000000000" pitchFamily="34" charset="-128"/>
-                <a:ea typeface="Adobe Fan Heiti Std B" panose="020B0700000000000000" pitchFamily="34" charset="-128"/>
-              </a:rPr>
-              <a:t>LayoutParams</a:t>
-            </a:r>
-            <a:endParaRPr lang="en-US" sz="2000" dirty="0">
-              <a:solidFill>
-                <a:schemeClr val="bg1">
-                  <a:lumMod val="50000"/>
-                </a:schemeClr>
-              </a:solidFill>
-              <a:latin typeface="Adobe Fan Heiti Std B" panose="020B0700000000000000" pitchFamily="34" charset="-128"/>
-              <a:ea typeface="Adobe Fan Heiti Std B" panose="020B0700000000000000" pitchFamily="34" charset="-128"/>
-            </a:endParaRPr>
-          </a:p>
-        </p:txBody>
-      </p:sp>
     </p:spTree>
     <p:extLst>
       <p:ext uri="{BB962C8B-B14F-4D97-AF65-F5344CB8AC3E}">
-        <p14:creationId xmlns:p14="http://schemas.microsoft.com/office/powerpoint/2010/main" val="2311872277"/>
+        <p14:creationId xmlns:p14="http://schemas.microsoft.com/office/powerpoint/2010/main" val="1523060745"/>
       </p:ext>
     </p:extLst>
   </p:cSld>
@@ -10220,7 +10099,7 @@
         </p:nvSpPr>
         <p:spPr>
           <a:xfrm>
-            <a:off x="1720469" y="1515537"/>
+            <a:off x="1720469" y="1333505"/>
             <a:ext cx="8858048" cy="461665"/>
           </a:xfrm>
           <a:prstGeom prst="rect">
@@ -10239,45 +10118,45 @@
                 <a:latin typeface="Adobe Fan Heiti Std B" panose="020B0700000000000000" pitchFamily="34" charset="-128"/>
                 <a:ea typeface="Adobe Fan Heiti Std B" panose="020B0700000000000000" pitchFamily="34" charset="-128"/>
               </a:rPr>
-              <a:t>Step 3:  In Card class, add </a:t>
+              <a:t>Step 2: </a:t>
+            </a:r>
+            <a:r>
+              <a:rPr lang="en-US" sz="2400" dirty="0">
+                <a:latin typeface="Adobe Fan Heiti Std B" panose="020B0700000000000000" pitchFamily="34" charset="-128"/>
+                <a:ea typeface="Adobe Fan Heiti Std B" panose="020B0700000000000000" pitchFamily="34" charset="-128"/>
+                <a:cs typeface="Adobe Devanagari" panose="02040503050201020203" pitchFamily="18" charset="0"/>
+              </a:rPr>
+              <a:t>In the constructor, add </a:t>
             </a:r>
             <a:r>
               <a:rPr lang="en-US" sz="2400" dirty="0" err="1">
                 <a:latin typeface="Adobe Fan Heiti Std B" panose="020B0700000000000000" pitchFamily="34" charset="-128"/>
                 <a:ea typeface="Adobe Fan Heiti Std B" panose="020B0700000000000000" pitchFamily="34" charset="-128"/>
+                <a:cs typeface="Adobe Devanagari" panose="02040503050201020203" pitchFamily="18" charset="0"/>
               </a:rPr>
-              <a:t>getNum</a:t>
+              <a:t>TextView</a:t>
             </a:r>
             <a:r>
               <a:rPr lang="en-US" sz="2400" dirty="0">
                 <a:latin typeface="Adobe Fan Heiti Std B" panose="020B0700000000000000" pitchFamily="34" charset="-128"/>
                 <a:ea typeface="Adobe Fan Heiti Std B" panose="020B0700000000000000" pitchFamily="34" charset="-128"/>
+                <a:cs typeface="Adobe Devanagari" panose="02040503050201020203" pitchFamily="18" charset="0"/>
               </a:rPr>
-              <a:t>(), </a:t>
-            </a:r>
-            <a:r>
-              <a:rPr lang="en-US" sz="2400" dirty="0" err="1">
-                <a:latin typeface="Adobe Fan Heiti Std B" panose="020B0700000000000000" pitchFamily="34" charset="-128"/>
-                <a:ea typeface="Adobe Fan Heiti Std B" panose="020B0700000000000000" pitchFamily="34" charset="-128"/>
-              </a:rPr>
-              <a:t>setNum</a:t>
-            </a:r>
-            <a:r>
-              <a:rPr lang="en-US" sz="2400" dirty="0">
-                <a:latin typeface="Adobe Fan Heiti Std B" panose="020B0700000000000000" pitchFamily="34" charset="-128"/>
-                <a:ea typeface="Adobe Fan Heiti Std B" panose="020B0700000000000000" pitchFamily="34" charset="-128"/>
-              </a:rPr>
-              <a:t>(), equals().</a:t>
-            </a:r>
+              <a:t> to display the number </a:t>
+            </a:r>
+            <a:endParaRPr lang="en-US" sz="2400" dirty="0">
+              <a:latin typeface="Adobe Fan Heiti Std B" panose="020B0700000000000000" pitchFamily="34" charset="-128"/>
+              <a:ea typeface="Adobe Fan Heiti Std B" panose="020B0700000000000000" pitchFamily="34" charset="-128"/>
+            </a:endParaRPr>
           </a:p>
         </p:txBody>
       </p:sp>
       <p:pic>
         <p:nvPicPr>
-          <p:cNvPr id="3" name="Picture 2">
+          <p:cNvPr id="4" name="Picture 3">
             <a:extLst>
               <a:ext uri="{FF2B5EF4-FFF2-40B4-BE49-F238E27FC236}">
-                <a16:creationId xmlns:a16="http://schemas.microsoft.com/office/drawing/2014/main" id="{296C5341-A643-463C-A5B7-0B73B11C19DA}"/>
+                <a16:creationId xmlns:a16="http://schemas.microsoft.com/office/drawing/2014/main" id="{DFB7E347-4E60-4BFA-A747-CA4DC69F1DA4}"/>
               </a:ext>
             </a:extLst>
           </p:cNvPr>
@@ -10294,18 +10173,82 @@
         </p:blipFill>
         <p:spPr>
           <a:xfrm>
-            <a:off x="1790700" y="2676525"/>
-            <a:ext cx="8610600" cy="1504950"/>
+            <a:off x="1720469" y="1874115"/>
+            <a:ext cx="6970770" cy="3291303"/>
           </a:xfrm>
           <a:prstGeom prst="rect">
             <a:avLst/>
           </a:prstGeom>
         </p:spPr>
       </p:pic>
+      <p:sp>
+        <p:nvSpPr>
+          <p:cNvPr id="6" name="TextBox 5">
+            <a:extLst>
+              <a:ext uri="{FF2B5EF4-FFF2-40B4-BE49-F238E27FC236}">
+                <a16:creationId xmlns:a16="http://schemas.microsoft.com/office/drawing/2014/main" id="{CCF968BA-D738-473C-9C77-C83410186B46}"/>
+              </a:ext>
+            </a:extLst>
+          </p:cNvPr>
+          <p:cNvSpPr txBox="1"/>
+          <p:nvPr/>
+        </p:nvSpPr>
+        <p:spPr>
+          <a:xfrm>
+            <a:off x="1720469" y="5417891"/>
+            <a:ext cx="9479902" cy="830997"/>
+          </a:xfrm>
+          <a:prstGeom prst="rect">
+            <a:avLst/>
+          </a:prstGeom>
+          <a:noFill/>
+        </p:spPr>
+        <p:txBody>
+          <a:bodyPr wrap="square" rtlCol="0">
+            <a:spAutoFit/>
+          </a:bodyPr>
+          <a:lstStyle/>
+          <a:p>
+            <a:r>
+              <a:rPr lang="en-US" sz="2400" dirty="0">
+                <a:solidFill>
+                  <a:schemeClr val="bg1">
+                    <a:lumMod val="50000"/>
+                  </a:schemeClr>
+                </a:solidFill>
+                <a:latin typeface="Adobe Fan Heiti Std B" panose="020B0700000000000000" pitchFamily="34" charset="-128"/>
+                <a:ea typeface="Adobe Fan Heiti Std B" panose="020B0700000000000000" pitchFamily="34" charset="-128"/>
+              </a:rPr>
+              <a:t>Tips: If you want the create a view in java code, you need to use the class - </a:t>
+            </a:r>
+            <a:r>
+              <a:rPr lang="en-US" sz="2400" dirty="0" err="1">
+                <a:solidFill>
+                  <a:schemeClr val="bg1">
+                    <a:lumMod val="50000"/>
+                  </a:schemeClr>
+                </a:solidFill>
+                <a:latin typeface="Adobe Fan Heiti Std B" panose="020B0700000000000000" pitchFamily="34" charset="-128"/>
+                <a:ea typeface="Adobe Fan Heiti Std B" panose="020B0700000000000000" pitchFamily="34" charset="-128"/>
+              </a:rPr>
+              <a:t>LayoutParams</a:t>
+            </a:r>
+            <a:endParaRPr lang="en-US" sz="2000" dirty="0">
+              <a:solidFill>
+                <a:schemeClr val="bg1">
+                  <a:lumMod val="50000"/>
+                </a:schemeClr>
+              </a:solidFill>
+              <a:latin typeface="Adobe Fan Heiti Std B" panose="020B0700000000000000" pitchFamily="34" charset="-128"/>
+              <a:ea typeface="Adobe Fan Heiti Std B" panose="020B0700000000000000" pitchFamily="34" charset="-128"/>
+            </a:endParaRPr>
+          </a:p>
+        </p:txBody>
+      </p:sp>
     </p:spTree>
     <p:extLst>
       <p:ext uri="{BB962C8B-B14F-4D97-AF65-F5344CB8AC3E}">
-        <p14:creationId xmlns:p14="http://schemas.microsoft.com/office/powerpoint/2010/main" val="3975897651"/>
+        <p14:creationId xmlns:p14="http://schemas.microsoft.com/office/powerpoint/2010/main" val="2311872277"/>
       </p:ext>
     </p:extLst>
   </p:cSld>
@@ -10348,41 +10291,10 @@
             <p:ph type="title"/>
           </p:nvPr>
         </p:nvSpPr>
-        <p:spPr/>
-        <p:txBody>
-          <a:bodyPr/>
-          <a:lstStyle/>
-          <a:p>
-            <a:r>
-              <a:rPr lang="en-US" dirty="0">
-                <a:latin typeface="Adobe Gothic Std B" panose="020B0800000000000000" pitchFamily="34" charset="-128"/>
-                <a:ea typeface="Adobe Gothic Std B" panose="020B0800000000000000" pitchFamily="34" charset="-128"/>
-              </a:rPr>
-              <a:t>Animation</a:t>
-            </a:r>
-          </a:p>
-        </p:txBody>
-      </p:sp>
-      <p:sp>
-        <p:nvSpPr>
-          <p:cNvPr id="3" name="Content Placeholder 2">
-            <a:extLst>
-              <a:ext uri="{FF2B5EF4-FFF2-40B4-BE49-F238E27FC236}">
-                <a16:creationId xmlns:a16="http://schemas.microsoft.com/office/drawing/2014/main" id="{AB89BAAB-295C-46E4-B19F-7080B14FC92B}"/>
-              </a:ext>
-            </a:extLst>
-          </p:cNvPr>
-          <p:cNvSpPr>
-            <a:spLocks noGrp="1"/>
-          </p:cNvSpPr>
-          <p:nvPr>
-            <p:ph idx="1"/>
-          </p:nvPr>
-        </p:nvSpPr>
         <p:spPr>
           <a:xfrm>
-            <a:off x="2589212" y="2133600"/>
-            <a:ext cx="8915400" cy="3931640"/>
+            <a:off x="1720469" y="606986"/>
+            <a:ext cx="9061010" cy="726519"/>
           </a:xfrm>
         </p:spPr>
         <p:txBody>
@@ -10392,69 +10304,119 @@
           <a:lstStyle/>
           <a:p>
             <a:r>
-              <a:rPr lang="en-US" sz="2800" dirty="0">
-                <a:latin typeface="Adobe Fan Heiti Std B" panose="020B0700000000000000" pitchFamily="34" charset="-128"/>
-                <a:ea typeface="Adobe Fan Heiti Std B" panose="020B0700000000000000" pitchFamily="34" charset="-128"/>
-                <a:cs typeface="Adobe Devanagari" panose="02040503050201020203" pitchFamily="18" charset="0"/>
+              <a:rPr lang="en-US" dirty="0" err="1">
+                <a:latin typeface="Adobe Gothic Std B" panose="020B0800000000000000" pitchFamily="34" charset="-128"/>
+                <a:ea typeface="Adobe Gothic Std B" panose="020B0800000000000000" pitchFamily="34" charset="-128"/>
               </a:rPr>
-              <a:t>Property Animations </a:t>
-            </a:r>
-          </a:p>
-          <a:p>
-            <a:r>
-              <a:rPr lang="en-US" sz="2800" dirty="0">
-                <a:latin typeface="Adobe Fan Heiti Std B" panose="020B0700000000000000" pitchFamily="34" charset="-128"/>
-                <a:ea typeface="Adobe Fan Heiti Std B" panose="020B0700000000000000" pitchFamily="34" charset="-128"/>
-                <a:cs typeface="Adobe Devanagari" panose="02040503050201020203" pitchFamily="18" charset="0"/>
-              </a:rPr>
-              <a:t>View Animations</a:t>
-            </a:r>
-          </a:p>
-          <a:p>
-            <a:pPr lvl="1"/>
+              <a:t>FrameLayout</a:t>
+            </a:r>
+            <a:endParaRPr lang="en-US" dirty="0">
+              <a:latin typeface="Adobe Gothic Std B" panose="020B0800000000000000" pitchFamily="34" charset="-128"/>
+              <a:ea typeface="Adobe Gothic Std B" panose="020B0800000000000000" pitchFamily="34" charset="-128"/>
+            </a:endParaRPr>
+          </a:p>
+        </p:txBody>
+      </p:sp>
+      <p:sp>
+        <p:nvSpPr>
+          <p:cNvPr id="5" name="TextBox 4">
+            <a:extLst>
+              <a:ext uri="{FF2B5EF4-FFF2-40B4-BE49-F238E27FC236}">
+                <a16:creationId xmlns:a16="http://schemas.microsoft.com/office/drawing/2014/main" id="{4EF13458-918B-479C-9167-62849C1FAA87}"/>
+              </a:ext>
+            </a:extLst>
+          </p:cNvPr>
+          <p:cNvSpPr txBox="1"/>
+          <p:nvPr/>
+        </p:nvSpPr>
+        <p:spPr>
+          <a:xfrm>
+            <a:off x="1720469" y="1515537"/>
+            <a:ext cx="8858048" cy="461665"/>
+          </a:xfrm>
+          <a:prstGeom prst="rect">
+            <a:avLst/>
+          </a:prstGeom>
+          <a:noFill/>
+        </p:spPr>
+        <p:txBody>
+          <a:bodyPr wrap="square" rtlCol="0">
+            <a:spAutoFit/>
+          </a:bodyPr>
+          <a:lstStyle/>
+          <a:p>
             <a:r>
               <a:rPr lang="en-US" sz="2400" dirty="0">
                 <a:latin typeface="Adobe Fan Heiti Std B" panose="020B0700000000000000" pitchFamily="34" charset="-128"/>
                 <a:ea typeface="Adobe Fan Heiti Std B" panose="020B0700000000000000" pitchFamily="34" charset="-128"/>
               </a:rPr>
-              <a:t>Tween Animation</a:t>
-            </a:r>
-          </a:p>
-          <a:p>
-            <a:pPr lvl="1"/>
+              <a:t>Step 3:  In Card class, add </a:t>
+            </a:r>
+            <a:r>
+              <a:rPr lang="en-US" sz="2400" dirty="0" err="1">
+                <a:latin typeface="Adobe Fan Heiti Std B" panose="020B0700000000000000" pitchFamily="34" charset="-128"/>
+                <a:ea typeface="Adobe Fan Heiti Std B" panose="020B0700000000000000" pitchFamily="34" charset="-128"/>
+              </a:rPr>
+              <a:t>getNum</a:t>
+            </a:r>
             <a:r>
               <a:rPr lang="en-US" sz="2400" dirty="0">
                 <a:latin typeface="Adobe Fan Heiti Std B" panose="020B0700000000000000" pitchFamily="34" charset="-128"/>
                 <a:ea typeface="Adobe Fan Heiti Std B" panose="020B0700000000000000" pitchFamily="34" charset="-128"/>
               </a:rPr>
-              <a:t>Frame Animation</a:t>
-            </a:r>
-            <a:endParaRPr lang="en-US" sz="4000" dirty="0">
-              <a:latin typeface="Adobe Fan Heiti Std B" panose="020B0700000000000000" pitchFamily="34" charset="-128"/>
-              <a:ea typeface="Adobe Fan Heiti Std B" panose="020B0700000000000000" pitchFamily="34" charset="-128"/>
-              <a:cs typeface="Adobe Devanagari" panose="02040503050201020203" pitchFamily="18" charset="0"/>
-            </a:endParaRPr>
-          </a:p>
-          <a:p>
-            <a:r>
-              <a:rPr lang="en-US" sz="2800" dirty="0">
+              <a:t>(), </a:t>
+            </a:r>
+            <a:r>
+              <a:rPr lang="en-US" sz="2400" dirty="0" err="1">
                 <a:latin typeface="Adobe Fan Heiti Std B" panose="020B0700000000000000" pitchFamily="34" charset="-128"/>
                 <a:ea typeface="Adobe Fan Heiti Std B" panose="020B0700000000000000" pitchFamily="34" charset="-128"/>
-                <a:cs typeface="Adobe Devanagari" panose="02040503050201020203" pitchFamily="18" charset="0"/>
               </a:rPr>
-              <a:t>Drawable Animations</a:t>
-            </a:r>
-            <a:endParaRPr lang="en-US" sz="1600" dirty="0">
-              <a:latin typeface="Adobe Fan Heiti Std B" panose="020B0700000000000000" pitchFamily="34" charset="-128"/>
-              <a:ea typeface="Adobe Fan Heiti Std B" panose="020B0700000000000000" pitchFamily="34" charset="-128"/>
-            </a:endParaRPr>
-          </a:p>
-        </p:txBody>
-      </p:sp>
+              <a:t>setNum</a:t>
+            </a:r>
+            <a:r>
+              <a:rPr lang="en-US" sz="2400" dirty="0">
+                <a:latin typeface="Adobe Fan Heiti Std B" panose="020B0700000000000000" pitchFamily="34" charset="-128"/>
+                <a:ea typeface="Adobe Fan Heiti Std B" panose="020B0700000000000000" pitchFamily="34" charset="-128"/>
+              </a:rPr>
+              <a:t>(), equals().</a:t>
+            </a:r>
+          </a:p>
+        </p:txBody>
+      </p:sp>
+      <p:pic>
+        <p:nvPicPr>
+          <p:cNvPr id="3" name="Picture 2">
+            <a:extLst>
+              <a:ext uri="{FF2B5EF4-FFF2-40B4-BE49-F238E27FC236}">
+                <a16:creationId xmlns:a16="http://schemas.microsoft.com/office/drawing/2014/main" id="{296C5341-A643-463C-A5B7-0B73B11C19DA}"/>
+              </a:ext>
+            </a:extLst>
+          </p:cNvPr>
+          <p:cNvPicPr>
+            <a:picLocks noChangeAspect="1"/>
+          </p:cNvPicPr>
+          <p:nvPr/>
+        </p:nvPicPr>
+        <p:blipFill>
+          <a:blip r:embed="rId2"/>
+          <a:stretch>
+            <a:fillRect/>
+          </a:stretch>
+        </p:blipFill>
+        <p:spPr>
+          <a:xfrm>
+            <a:off x="1790700" y="2676525"/>
+            <a:ext cx="8610600" cy="1504950"/>
+          </a:xfrm>
+          <a:prstGeom prst="rect">
+            <a:avLst/>
+          </a:prstGeom>
+        </p:spPr>
+      </p:pic>
     </p:spTree>
     <p:extLst>
       <p:ext uri="{BB962C8B-B14F-4D97-AF65-F5344CB8AC3E}">
-        <p14:creationId xmlns:p14="http://schemas.microsoft.com/office/powerpoint/2010/main" val="3919997946"/>
+        <p14:creationId xmlns:p14="http://schemas.microsoft.com/office/powerpoint/2010/main" val="3975897651"/>
       </p:ext>
     </p:extLst>
   </p:cSld>
@@ -10497,16 +10459,9 @@
             <p:ph type="title"/>
           </p:nvPr>
         </p:nvSpPr>
-        <p:spPr>
-          <a:xfrm>
-            <a:off x="1720469" y="606986"/>
-            <a:ext cx="9061010" cy="726519"/>
-          </a:xfrm>
-        </p:spPr>
-        <p:txBody>
-          <a:bodyPr>
-            <a:normAutofit/>
-          </a:bodyPr>
+        <p:spPr/>
+        <p:txBody>
+          <a:bodyPr/>
           <a:lstStyle/>
           <a:p>
             <a:r>
@@ -10521,76 +10476,96 @@
       </p:sp>
       <p:sp>
         <p:nvSpPr>
-          <p:cNvPr id="5" name="TextBox 4">
+          <p:cNvPr id="3" name="Content Placeholder 2">
             <a:extLst>
               <a:ext uri="{FF2B5EF4-FFF2-40B4-BE49-F238E27FC236}">
-                <a16:creationId xmlns:a16="http://schemas.microsoft.com/office/drawing/2014/main" id="{4EF13458-918B-479C-9167-62849C1FAA87}"/>
+                <a16:creationId xmlns:a16="http://schemas.microsoft.com/office/drawing/2014/main" id="{AB89BAAB-295C-46E4-B19F-7080B14FC92B}"/>
               </a:ext>
             </a:extLst>
           </p:cNvPr>
-          <p:cNvSpPr txBox="1"/>
-          <p:nvPr/>
+          <p:cNvSpPr>
+            <a:spLocks noGrp="1"/>
+          </p:cNvSpPr>
+          <p:nvPr>
+            <p:ph idx="1"/>
+          </p:nvPr>
         </p:nvSpPr>
         <p:spPr>
           <a:xfrm>
-            <a:off x="1720468" y="1515537"/>
-            <a:ext cx="9190187" cy="461665"/>
-          </a:xfrm>
-          <a:prstGeom prst="rect">
-            <a:avLst/>
-          </a:prstGeom>
-          <a:noFill/>
-        </p:spPr>
-        <p:txBody>
-          <a:bodyPr wrap="square" rtlCol="0">
-            <a:spAutoFit/>
+            <a:off x="2589212" y="2133600"/>
+            <a:ext cx="8915400" cy="3931640"/>
+          </a:xfrm>
+        </p:spPr>
+        <p:txBody>
+          <a:bodyPr>
+            <a:normAutofit/>
           </a:bodyPr>
           <a:lstStyle/>
           <a:p>
+            <a:r>
+              <a:rPr lang="en-US" sz="2800" dirty="0">
+                <a:latin typeface="Adobe Fan Heiti Std B" panose="020B0700000000000000" pitchFamily="34" charset="-128"/>
+                <a:ea typeface="Adobe Fan Heiti Std B" panose="020B0700000000000000" pitchFamily="34" charset="-128"/>
+                <a:cs typeface="Adobe Devanagari" panose="02040503050201020203" pitchFamily="18" charset="0"/>
+              </a:rPr>
+              <a:t>Property Animations </a:t>
+            </a:r>
+          </a:p>
+          <a:p>
+            <a:r>
+              <a:rPr lang="en-US" sz="2800" dirty="0">
+                <a:latin typeface="Adobe Fan Heiti Std B" panose="020B0700000000000000" pitchFamily="34" charset="-128"/>
+                <a:ea typeface="Adobe Fan Heiti Std B" panose="020B0700000000000000" pitchFamily="34" charset="-128"/>
+                <a:cs typeface="Adobe Devanagari" panose="02040503050201020203" pitchFamily="18" charset="0"/>
+              </a:rPr>
+              <a:t>View Animations</a:t>
+            </a:r>
+          </a:p>
+          <a:p>
+            <a:pPr lvl="1"/>
             <a:r>
               <a:rPr lang="en-US" sz="2400" dirty="0">
                 <a:latin typeface="Adobe Fan Heiti Std B" panose="020B0700000000000000" pitchFamily="34" charset="-128"/>
                 <a:ea typeface="Adobe Fan Heiti Std B" panose="020B0700000000000000" pitchFamily="34" charset="-128"/>
               </a:rPr>
-              <a:t>Game Title Name Animation for changing Colors using Java Code</a:t>
-            </a:r>
-          </a:p>
-        </p:txBody>
-      </p:sp>
-      <p:pic>
-        <p:nvPicPr>
-          <p:cNvPr id="8" name="Picture 7">
-            <a:extLst>
-              <a:ext uri="{FF2B5EF4-FFF2-40B4-BE49-F238E27FC236}">
-                <a16:creationId xmlns:a16="http://schemas.microsoft.com/office/drawing/2014/main" id="{8909A708-735F-4871-BF89-E4C619AE1755}"/>
-              </a:ext>
-            </a:extLst>
-          </p:cNvPr>
-          <p:cNvPicPr>
-            <a:picLocks noChangeAspect="1"/>
-          </p:cNvPicPr>
-          <p:nvPr/>
-        </p:nvPicPr>
-        <p:blipFill>
-          <a:blip r:embed="rId2"/>
-          <a:stretch>
-            <a:fillRect/>
-          </a:stretch>
-        </p:blipFill>
-        <p:spPr>
-          <a:xfrm>
-            <a:off x="891693" y="2816394"/>
-            <a:ext cx="10515600" cy="3267075"/>
-          </a:xfrm>
-          <a:prstGeom prst="rect">
-            <a:avLst/>
-          </a:prstGeom>
-        </p:spPr>
-      </p:pic>
+              <a:t>Tween Animation</a:t>
+            </a:r>
+          </a:p>
+          <a:p>
+            <a:pPr lvl="1"/>
+            <a:r>
+              <a:rPr lang="en-US" sz="2400" dirty="0">
+                <a:latin typeface="Adobe Fan Heiti Std B" panose="020B0700000000000000" pitchFamily="34" charset="-128"/>
+                <a:ea typeface="Adobe Fan Heiti Std B" panose="020B0700000000000000" pitchFamily="34" charset="-128"/>
+              </a:rPr>
+              <a:t>Frame Animation</a:t>
+            </a:r>
+            <a:endParaRPr lang="en-US" sz="4000" dirty="0">
+              <a:latin typeface="Adobe Fan Heiti Std B" panose="020B0700000000000000" pitchFamily="34" charset="-128"/>
+              <a:ea typeface="Adobe Fan Heiti Std B" panose="020B0700000000000000" pitchFamily="34" charset="-128"/>
+              <a:cs typeface="Adobe Devanagari" panose="02040503050201020203" pitchFamily="18" charset="0"/>
+            </a:endParaRPr>
+          </a:p>
+          <a:p>
+            <a:r>
+              <a:rPr lang="en-US" sz="2800" dirty="0">
+                <a:latin typeface="Adobe Fan Heiti Std B" panose="020B0700000000000000" pitchFamily="34" charset="-128"/>
+                <a:ea typeface="Adobe Fan Heiti Std B" panose="020B0700000000000000" pitchFamily="34" charset="-128"/>
+                <a:cs typeface="Adobe Devanagari" panose="02040503050201020203" pitchFamily="18" charset="0"/>
+              </a:rPr>
+              <a:t>Drawable Animations</a:t>
+            </a:r>
+            <a:endParaRPr lang="en-US" sz="1600" dirty="0">
+              <a:latin typeface="Adobe Fan Heiti Std B" panose="020B0700000000000000" pitchFamily="34" charset="-128"/>
+              <a:ea typeface="Adobe Fan Heiti Std B" panose="020B0700000000000000" pitchFamily="34" charset="-128"/>
+            </a:endParaRPr>
+          </a:p>
+        </p:txBody>
+      </p:sp>
     </p:spTree>
     <p:extLst>
       <p:ext uri="{BB962C8B-B14F-4D97-AF65-F5344CB8AC3E}">
-        <p14:creationId xmlns:p14="http://schemas.microsoft.com/office/powerpoint/2010/main" val="569600234"/>
+        <p14:creationId xmlns:p14="http://schemas.microsoft.com/office/powerpoint/2010/main" val="3919997946"/>
       </p:ext>
     </p:extLst>
   </p:cSld>
@@ -10635,7 +10610,7 @@
         </p:nvSpPr>
         <p:spPr>
           <a:xfrm>
-            <a:off x="1666976" y="148205"/>
+            <a:off x="1720469" y="606986"/>
             <a:ext cx="9061010" cy="726519"/>
           </a:xfrm>
         </p:spPr>
@@ -10646,12 +10621,16 @@
           <a:lstStyle/>
           <a:p>
             <a:r>
-              <a:rPr lang="en-US" dirty="0">
+              <a:rPr lang="en-US">
                 <a:latin typeface="Adobe Gothic Std B" panose="020B0800000000000000" pitchFamily="34" charset="-128"/>
                 <a:ea typeface="Adobe Gothic Std B" panose="020B0800000000000000" pitchFamily="34" charset="-128"/>
               </a:rPr>
               <a:t>Animation</a:t>
             </a:r>
+            <a:endParaRPr lang="en-US" dirty="0">
+              <a:latin typeface="Adobe Gothic Std B" panose="020B0800000000000000" pitchFamily="34" charset="-128"/>
+              <a:ea typeface="Adobe Gothic Std B" panose="020B0800000000000000" pitchFamily="34" charset="-128"/>
+            </a:endParaRPr>
           </a:p>
         </p:txBody>
       </p:sp>
@@ -10669,8 +10648,8 @@
         </p:nvSpPr>
         <p:spPr>
           <a:xfrm>
-            <a:off x="1666976" y="829907"/>
-            <a:ext cx="8858048" cy="1569660"/>
+            <a:off x="1720469" y="1635345"/>
+            <a:ext cx="8858048" cy="2308324"/>
           </a:xfrm>
           <a:prstGeom prst="rect">
             <a:avLst/>
@@ -10684,98 +10663,58 @@
           <a:lstStyle/>
           <a:p>
             <a:r>
-              <a:rPr lang="en-US" sz="2400" dirty="0">
+              <a:rPr lang="en-US" altLang="zh-CN" sz="2400" dirty="0">
                 <a:latin typeface="Adobe Fan Heiti Std B" panose="020B0700000000000000" pitchFamily="34" charset="-128"/>
                 <a:ea typeface="Adobe Fan Heiti Std B" panose="020B0700000000000000" pitchFamily="34" charset="-128"/>
               </a:rPr>
-              <a:t>Game Title Name Animation for rotation using xml</a:t>
-            </a:r>
-          </a:p>
-          <a:p>
+              <a:t>In the project, in order to avoid disturbing the player, I tried my best to add animation effects.</a:t>
+            </a:r>
+          </a:p>
+          <a:p>
+            <a:endParaRPr lang="en-US" altLang="zh-CN" sz="2400" dirty="0">
+              <a:latin typeface="Adobe Fan Heiti Std B" panose="020B0700000000000000" pitchFamily="34" charset="-128"/>
+              <a:ea typeface="Adobe Fan Heiti Std B" panose="020B0700000000000000" pitchFamily="34" charset="-128"/>
+            </a:endParaRPr>
+          </a:p>
+          <a:p>
+            <a:endParaRPr lang="en-US" altLang="zh-CN" sz="2400" dirty="0">
+              <a:latin typeface="Adobe Fan Heiti Std B" panose="020B0700000000000000" pitchFamily="34" charset="-128"/>
+              <a:ea typeface="Adobe Fan Heiti Std B" panose="020B0700000000000000" pitchFamily="34" charset="-128"/>
+            </a:endParaRPr>
+          </a:p>
+          <a:p>
+            <a:r>
+              <a:rPr lang="en-US" altLang="zh-CN" sz="2400" dirty="0">
+                <a:latin typeface="Adobe Fan Heiti Std B" panose="020B0700000000000000" pitchFamily="34" charset="-128"/>
+                <a:ea typeface="Adobe Fan Heiti Std B" panose="020B0700000000000000" pitchFamily="34" charset="-128"/>
+              </a:rPr>
+              <a:t>In my </a:t>
+            </a:r>
+            <a:r>
+              <a:rPr lang="en-US" altLang="zh-CN" sz="2400" dirty="0" err="1">
+                <a:latin typeface="Adobe Fan Heiti Std B" panose="020B0700000000000000" pitchFamily="34" charset="-128"/>
+                <a:ea typeface="Adobe Fan Heiti Std B" panose="020B0700000000000000" pitchFamily="34" charset="-128"/>
+              </a:rPr>
+              <a:t>Github</a:t>
+            </a:r>
+            <a:r>
+              <a:rPr lang="en-US" altLang="zh-CN" sz="2400" dirty="0">
+                <a:latin typeface="Adobe Fan Heiti Std B" panose="020B0700000000000000" pitchFamily="34" charset="-128"/>
+                <a:ea typeface="Adobe Fan Heiti Std B" panose="020B0700000000000000" pitchFamily="34" charset="-128"/>
+              </a:rPr>
+              <a:t>, there are some animation demos. If you are interested, you can download it. </a:t>
+            </a:r>
             <a:endParaRPr lang="en-US" sz="2400" dirty="0">
               <a:latin typeface="Adobe Fan Heiti Std B" panose="020B0700000000000000" pitchFamily="34" charset="-128"/>
               <a:ea typeface="Adobe Fan Heiti Std B" panose="020B0700000000000000" pitchFamily="34" charset="-128"/>
             </a:endParaRPr>
           </a:p>
-          <a:p>
-            <a:r>
-              <a:rPr lang="en-US" altLang="zh-CN" sz="2400" dirty="0">
-                <a:latin typeface="Adobe Fan Heiti Std B" panose="020B0700000000000000" pitchFamily="34" charset="-128"/>
-                <a:ea typeface="Adobe Fan Heiti Std B" panose="020B0700000000000000" pitchFamily="34" charset="-128"/>
-              </a:rPr>
-              <a:t>1.Create game2048_game_title_state_change.xml in animator file</a:t>
-            </a:r>
-            <a:endParaRPr lang="en-US" sz="2400" dirty="0">
-              <a:latin typeface="Adobe Fan Heiti Std B" panose="020B0700000000000000" pitchFamily="34" charset="-128"/>
-              <a:ea typeface="Adobe Fan Heiti Std B" panose="020B0700000000000000" pitchFamily="34" charset="-128"/>
-            </a:endParaRPr>
-          </a:p>
-        </p:txBody>
-      </p:sp>
-      <p:pic>
-        <p:nvPicPr>
-          <p:cNvPr id="4" name="Picture 3">
-            <a:extLst>
-              <a:ext uri="{FF2B5EF4-FFF2-40B4-BE49-F238E27FC236}">
-                <a16:creationId xmlns:a16="http://schemas.microsoft.com/office/drawing/2014/main" id="{9E16BDA3-A1C7-45F4-B37C-8450559C2D88}"/>
-              </a:ext>
-            </a:extLst>
-          </p:cNvPr>
-          <p:cNvPicPr>
-            <a:picLocks noChangeAspect="1"/>
-          </p:cNvPicPr>
-          <p:nvPr/>
-        </p:nvPicPr>
-        <p:blipFill>
-          <a:blip r:embed="rId2"/>
-          <a:stretch>
-            <a:fillRect/>
-          </a:stretch>
-        </p:blipFill>
-        <p:spPr>
-          <a:xfrm>
-            <a:off x="348772" y="2399567"/>
-            <a:ext cx="6238875" cy="4343400"/>
-          </a:xfrm>
-          <a:prstGeom prst="rect">
-            <a:avLst/>
-          </a:prstGeom>
-        </p:spPr>
-      </p:pic>
-      <p:pic>
-        <p:nvPicPr>
-          <p:cNvPr id="6" name="Picture 5">
-            <a:extLst>
-              <a:ext uri="{FF2B5EF4-FFF2-40B4-BE49-F238E27FC236}">
-                <a16:creationId xmlns:a16="http://schemas.microsoft.com/office/drawing/2014/main" id="{87A54DA5-4E85-48F7-8B62-35F42B64F849}"/>
-              </a:ext>
-            </a:extLst>
-          </p:cNvPr>
-          <p:cNvPicPr>
-            <a:picLocks noChangeAspect="1"/>
-          </p:cNvPicPr>
-          <p:nvPr/>
-        </p:nvPicPr>
-        <p:blipFill>
-          <a:blip r:embed="rId3"/>
-          <a:stretch>
-            <a:fillRect/>
-          </a:stretch>
-        </p:blipFill>
-        <p:spPr>
-          <a:xfrm>
-            <a:off x="6587647" y="2124075"/>
-            <a:ext cx="5362575" cy="4733925"/>
-          </a:xfrm>
-          <a:prstGeom prst="rect">
-            <a:avLst/>
-          </a:prstGeom>
-        </p:spPr>
-      </p:pic>
+        </p:txBody>
+      </p:sp>
     </p:spTree>
     <p:extLst>
       <p:ext uri="{BB962C8B-B14F-4D97-AF65-F5344CB8AC3E}">
-        <p14:creationId xmlns:p14="http://schemas.microsoft.com/office/powerpoint/2010/main" val="2369293623"/>
+        <p14:creationId xmlns:p14="http://schemas.microsoft.com/office/powerpoint/2010/main" val="3978820758"/>
       </p:ext>
     </p:extLst>
   </p:cSld>
@@ -10854,8 +10793,8 @@
         </p:nvSpPr>
         <p:spPr>
           <a:xfrm>
-            <a:off x="1666976" y="1333505"/>
-            <a:ext cx="8858048" cy="461665"/>
+            <a:off x="1720468" y="1515537"/>
+            <a:ext cx="9190187" cy="461665"/>
           </a:xfrm>
           <a:prstGeom prst="rect">
             <a:avLst/>
@@ -10869,39 +10808,21 @@
           <a:lstStyle/>
           <a:p>
             <a:r>
-              <a:rPr lang="en-US" altLang="zh-CN" sz="2400" dirty="0">
+              <a:rPr lang="en-US" sz="2400" dirty="0">
                 <a:latin typeface="Adobe Fan Heiti Std B" panose="020B0700000000000000" pitchFamily="34" charset="-128"/>
                 <a:ea typeface="Adobe Fan Heiti Std B" panose="020B0700000000000000" pitchFamily="34" charset="-128"/>
               </a:rPr>
-              <a:t>2. Setting </a:t>
-            </a:r>
-            <a:r>
-              <a:rPr lang="en-US" altLang="zh-CN" sz="2400" dirty="0" err="1">
-                <a:latin typeface="Adobe Fan Heiti Std B" panose="020B0700000000000000" pitchFamily="34" charset="-128"/>
-                <a:ea typeface="Adobe Fan Heiti Std B" panose="020B0700000000000000" pitchFamily="34" charset="-128"/>
-              </a:rPr>
-              <a:t>android:stateListAnimator</a:t>
-            </a:r>
-            <a:r>
-              <a:rPr lang="en-US" altLang="zh-CN" sz="2400" dirty="0">
-                <a:latin typeface="Adobe Fan Heiti Std B" panose="020B0700000000000000" pitchFamily="34" charset="-128"/>
-                <a:ea typeface="Adobe Fan Heiti Std B" panose="020B0700000000000000" pitchFamily="34" charset="-128"/>
-              </a:rPr>
-              <a:t> in activity_main.xml</a:t>
-            </a:r>
-            <a:endParaRPr lang="en-US" sz="2400" dirty="0">
-              <a:latin typeface="Adobe Fan Heiti Std B" panose="020B0700000000000000" pitchFamily="34" charset="-128"/>
-              <a:ea typeface="Adobe Fan Heiti Std B" panose="020B0700000000000000" pitchFamily="34" charset="-128"/>
-            </a:endParaRPr>
+              <a:t>Game Title Name Animation for changing Colors using Java Code</a:t>
+            </a:r>
           </a:p>
         </p:txBody>
       </p:sp>
       <p:pic>
         <p:nvPicPr>
-          <p:cNvPr id="7" name="Picture 6">
+          <p:cNvPr id="8" name="Picture 7">
             <a:extLst>
               <a:ext uri="{FF2B5EF4-FFF2-40B4-BE49-F238E27FC236}">
-                <a16:creationId xmlns:a16="http://schemas.microsoft.com/office/drawing/2014/main" id="{715CF926-A282-4100-BDA3-551F66D7AAC5}"/>
+                <a16:creationId xmlns:a16="http://schemas.microsoft.com/office/drawing/2014/main" id="{8909A708-735F-4871-BF89-E4C619AE1755}"/>
               </a:ext>
             </a:extLst>
           </p:cNvPr>
@@ -10918,8 +10839,8 @@
         </p:blipFill>
         <p:spPr>
           <a:xfrm>
-            <a:off x="1720469" y="2334892"/>
-            <a:ext cx="8439150" cy="2943225"/>
+            <a:off x="891693" y="2816394"/>
+            <a:ext cx="10515600" cy="3267075"/>
           </a:xfrm>
           <a:prstGeom prst="rect">
             <a:avLst/>
@@ -10929,7 +10850,7 @@
     </p:spTree>
     <p:extLst>
       <p:ext uri="{BB962C8B-B14F-4D97-AF65-F5344CB8AC3E}">
-        <p14:creationId xmlns:p14="http://schemas.microsoft.com/office/powerpoint/2010/main" val="51186027"/>
+        <p14:creationId xmlns:p14="http://schemas.microsoft.com/office/powerpoint/2010/main" val="569600234"/>
       </p:ext>
     </p:extLst>
   </p:cSld>
@@ -10982,7 +10903,7 @@
                 <a:latin typeface="Adobe Gothic Std B" panose="020B0800000000000000" pitchFamily="34" charset="-128"/>
                 <a:ea typeface="Adobe Gothic Std B" panose="020B0800000000000000" pitchFamily="34" charset="-128"/>
               </a:rPr>
-              <a:t>What do I need ?</a:t>
+              <a:t>About My 2048 Game Project</a:t>
             </a:r>
           </a:p>
         </p:txBody>
@@ -11009,83 +10930,41 @@
           <a:lstStyle/>
           <a:p>
             <a:r>
+              <a:rPr lang="en-US" sz="3200" dirty="0">
+                <a:latin typeface="Adobe Devanagari" panose="02040503050201020203" pitchFamily="18" charset="0"/>
+                <a:cs typeface="Adobe Devanagari" panose="02040503050201020203" pitchFamily="18" charset="0"/>
+              </a:rPr>
+              <a:t>Use API 23, there is a little bug on API 29. I used one day to solve this bug, but it is still there.</a:t>
+            </a:r>
+          </a:p>
+          <a:p>
+            <a:r>
+              <a:rPr lang="en-US" sz="3200" dirty="0">
+                <a:latin typeface="Adobe Devanagari" panose="02040503050201020203" pitchFamily="18" charset="0"/>
+                <a:cs typeface="Adobe Devanagari" panose="02040503050201020203" pitchFamily="18" charset="0"/>
+              </a:rPr>
+              <a:t>The ideal UI Resolution is 1080 * 1920. Density is 420dpi.</a:t>
+            </a:r>
+          </a:p>
+          <a:p>
+            <a:r>
+              <a:rPr lang="en-US" sz="3200" dirty="0">
+                <a:latin typeface="Adobe Devanagari" panose="02040503050201020203" pitchFamily="18" charset="0"/>
+                <a:cs typeface="Adobe Devanagari" panose="02040503050201020203" pitchFamily="18" charset="0"/>
+              </a:rPr>
+              <a:t>You can find this tutorial on my </a:t>
+            </a:r>
+            <a:r>
               <a:rPr lang="en-US" sz="3200" dirty="0" err="1">
                 <a:latin typeface="Adobe Devanagari" panose="02040503050201020203" pitchFamily="18" charset="0"/>
                 <a:cs typeface="Adobe Devanagari" panose="02040503050201020203" pitchFamily="18" charset="0"/>
               </a:rPr>
-              <a:t>GridLayout</a:t>
-            </a:r>
-            <a:r>
-              <a:rPr lang="en-US" sz="3200" dirty="0">
-                <a:latin typeface="Adobe Devanagari" panose="02040503050201020203" pitchFamily="18" charset="0"/>
-                <a:cs typeface="Adobe Devanagari" panose="02040503050201020203" pitchFamily="18" charset="0"/>
-              </a:rPr>
-              <a:t> </a:t>
-            </a:r>
-            <a:r>
-              <a:rPr lang="en-US" altLang="zh-CN" sz="3200" dirty="0">
-                <a:latin typeface="Adobe Devanagari" panose="02040503050201020203" pitchFamily="18" charset="0"/>
-                <a:cs typeface="Adobe Devanagari" panose="02040503050201020203" pitchFamily="18" charset="0"/>
-              </a:rPr>
-              <a:t>to design</a:t>
-            </a:r>
-            <a:r>
-              <a:rPr lang="en-US" sz="3200" dirty="0">
-                <a:latin typeface="Adobe Devanagari" panose="02040503050201020203" pitchFamily="18" charset="0"/>
-                <a:cs typeface="Adobe Devanagari" panose="02040503050201020203" pitchFamily="18" charset="0"/>
-              </a:rPr>
-              <a:t> Gameboard</a:t>
-            </a:r>
-          </a:p>
-          <a:p>
-            <a:r>
-              <a:rPr lang="en-US" sz="3200" dirty="0" err="1">
-                <a:latin typeface="Adobe Devanagari" panose="02040503050201020203" pitchFamily="18" charset="0"/>
-                <a:cs typeface="Adobe Devanagari" panose="02040503050201020203" pitchFamily="18" charset="0"/>
-              </a:rPr>
-              <a:t>FrameLayout</a:t>
-            </a:r>
-            <a:r>
-              <a:rPr lang="en-US" sz="3200" dirty="0">
-                <a:latin typeface="Adobe Devanagari" panose="02040503050201020203" pitchFamily="18" charset="0"/>
-                <a:cs typeface="Adobe Devanagari" panose="02040503050201020203" pitchFamily="18" charset="0"/>
-              </a:rPr>
-              <a:t> to design Card</a:t>
-            </a:r>
-          </a:p>
-          <a:p>
-            <a:r>
-              <a:rPr lang="en-US" sz="3200" dirty="0">
-                <a:latin typeface="Adobe Devanagari" panose="02040503050201020203" pitchFamily="18" charset="0"/>
-                <a:cs typeface="Adobe Devanagari" panose="02040503050201020203" pitchFamily="18" charset="0"/>
-              </a:rPr>
-              <a:t>Animation to achieve Card movement effect </a:t>
-            </a:r>
-          </a:p>
-          <a:p>
-            <a:r>
-              <a:rPr lang="en-US" sz="3200" dirty="0" err="1">
-                <a:latin typeface="Adobe Devanagari" panose="02040503050201020203" pitchFamily="18" charset="0"/>
-                <a:cs typeface="Adobe Devanagari" panose="02040503050201020203" pitchFamily="18" charset="0"/>
-              </a:rPr>
-              <a:t>AlertDialog</a:t>
-            </a:r>
-            <a:r>
-              <a:rPr lang="en-US" sz="3200" dirty="0">
-                <a:latin typeface="Adobe Devanagari" panose="02040503050201020203" pitchFamily="18" charset="0"/>
-                <a:cs typeface="Adobe Devanagari" panose="02040503050201020203" pitchFamily="18" charset="0"/>
-              </a:rPr>
-              <a:t> to interact with players</a:t>
-            </a:r>
-          </a:p>
-          <a:p>
-            <a:r>
-              <a:rPr lang="en-US" sz="3200" dirty="0">
-                <a:latin typeface="Adobe Devanagari" panose="02040503050201020203" pitchFamily="18" charset="0"/>
-                <a:cs typeface="Adobe Devanagari" panose="02040503050201020203" pitchFamily="18" charset="0"/>
-              </a:rPr>
-              <a:t>Notifications in case my content is not enough </a:t>
-            </a:r>
+              <a:t>Github</a:t>
+            </a:r>
+            <a:endParaRPr lang="en-US" sz="3200" dirty="0">
+              <a:latin typeface="Adobe Devanagari" panose="02040503050201020203" pitchFamily="18" charset="0"/>
+              <a:cs typeface="Adobe Devanagari" panose="02040503050201020203" pitchFamily="18" charset="0"/>
+            </a:endParaRPr>
           </a:p>
           <a:p>
             <a:endParaRPr lang="en-US" dirty="0"/>
@@ -11095,7 +10974,7 @@
     </p:spTree>
     <p:extLst>
       <p:ext uri="{BB962C8B-B14F-4D97-AF65-F5344CB8AC3E}">
-        <p14:creationId xmlns:p14="http://schemas.microsoft.com/office/powerpoint/2010/main" val="713874807"/>
+        <p14:creationId xmlns:p14="http://schemas.microsoft.com/office/powerpoint/2010/main" val="789206728"/>
       </p:ext>
     </p:extLst>
   </p:cSld>
@@ -11140,7 +11019,7 @@
         </p:nvSpPr>
         <p:spPr>
           <a:xfrm>
-            <a:off x="1720469" y="606986"/>
+            <a:off x="1666976" y="148205"/>
             <a:ext cx="9061010" cy="726519"/>
           </a:xfrm>
         </p:spPr>
@@ -11174,8 +11053,8 @@
         </p:nvSpPr>
         <p:spPr>
           <a:xfrm>
-            <a:off x="1666976" y="1333505"/>
-            <a:ext cx="8858048" cy="461665"/>
+            <a:off x="1666976" y="829907"/>
+            <a:ext cx="8858048" cy="1569660"/>
           </a:xfrm>
           <a:prstGeom prst="rect">
             <a:avLst/>
@@ -11189,25 +11068,26 @@
           <a:lstStyle/>
           <a:p>
             <a:r>
+              <a:rPr lang="en-US" sz="2400" dirty="0">
+                <a:latin typeface="Adobe Fan Heiti Std B" panose="020B0700000000000000" pitchFamily="34" charset="-128"/>
+                <a:ea typeface="Adobe Fan Heiti Std B" panose="020B0700000000000000" pitchFamily="34" charset="-128"/>
+              </a:rPr>
+              <a:t>Game Title Name Animation for rotation using xml</a:t>
+            </a:r>
+          </a:p>
+          <a:p>
+            <a:endParaRPr lang="en-US" sz="2400" dirty="0">
+              <a:latin typeface="Adobe Fan Heiti Std B" panose="020B0700000000000000" pitchFamily="34" charset="-128"/>
+              <a:ea typeface="Adobe Fan Heiti Std B" panose="020B0700000000000000" pitchFamily="34" charset="-128"/>
+            </a:endParaRPr>
+          </a:p>
+          <a:p>
+            <a:r>
               <a:rPr lang="en-US" altLang="zh-CN" sz="2400" dirty="0">
                 <a:latin typeface="Adobe Fan Heiti Std B" panose="020B0700000000000000" pitchFamily="34" charset="-128"/>
                 <a:ea typeface="Adobe Fan Heiti Std B" panose="020B0700000000000000" pitchFamily="34" charset="-128"/>
               </a:rPr>
-              <a:t>Add animation to zoom up Card in </a:t>
-            </a:r>
-            <a:r>
-              <a:rPr lang="en-US" altLang="zh-CN" sz="2400" dirty="0" err="1">
-                <a:latin typeface="Adobe Fan Heiti Std B" panose="020B0700000000000000" pitchFamily="34" charset="-128"/>
-                <a:ea typeface="Adobe Fan Heiti Std B" panose="020B0700000000000000" pitchFamily="34" charset="-128"/>
-              </a:rPr>
-              <a:t>GameView</a:t>
-            </a:r>
-            <a:r>
-              <a:rPr lang="en-US" altLang="zh-CN" sz="2400" dirty="0">
-                <a:latin typeface="Adobe Fan Heiti Std B" panose="020B0700000000000000" pitchFamily="34" charset="-128"/>
-                <a:ea typeface="Adobe Fan Heiti Std B" panose="020B0700000000000000" pitchFamily="34" charset="-128"/>
-              </a:rPr>
-              <a:t> Class</a:t>
+              <a:t>1.Create game2048_game_title_state_change.xml in animator folder</a:t>
             </a:r>
             <a:endParaRPr lang="en-US" sz="2400" dirty="0">
               <a:latin typeface="Adobe Fan Heiti Std B" panose="020B0700000000000000" pitchFamily="34" charset="-128"/>
@@ -11218,10 +11098,10 @@
       </p:sp>
       <p:pic>
         <p:nvPicPr>
-          <p:cNvPr id="3" name="Picture 2">
+          <p:cNvPr id="4" name="Picture 3">
             <a:extLst>
               <a:ext uri="{FF2B5EF4-FFF2-40B4-BE49-F238E27FC236}">
-                <a16:creationId xmlns:a16="http://schemas.microsoft.com/office/drawing/2014/main" id="{12C7106C-DC16-416E-BCF2-6F26859A0BE5}"/>
+                <a16:creationId xmlns:a16="http://schemas.microsoft.com/office/drawing/2014/main" id="{9E16BDA3-A1C7-45F4-B37C-8450559C2D88}"/>
               </a:ext>
             </a:extLst>
           </p:cNvPr>
@@ -11238,8 +11118,38 @@
         </p:blipFill>
         <p:spPr>
           <a:xfrm>
-            <a:off x="1666976" y="2521689"/>
-            <a:ext cx="8115300" cy="2581275"/>
+            <a:off x="348772" y="2399567"/>
+            <a:ext cx="6238875" cy="4343400"/>
+          </a:xfrm>
+          <a:prstGeom prst="rect">
+            <a:avLst/>
+          </a:prstGeom>
+        </p:spPr>
+      </p:pic>
+      <p:pic>
+        <p:nvPicPr>
+          <p:cNvPr id="6" name="Picture 5">
+            <a:extLst>
+              <a:ext uri="{FF2B5EF4-FFF2-40B4-BE49-F238E27FC236}">
+                <a16:creationId xmlns:a16="http://schemas.microsoft.com/office/drawing/2014/main" id="{87A54DA5-4E85-48F7-8B62-35F42B64F849}"/>
+              </a:ext>
+            </a:extLst>
+          </p:cNvPr>
+          <p:cNvPicPr>
+            <a:picLocks noChangeAspect="1"/>
+          </p:cNvPicPr>
+          <p:nvPr/>
+        </p:nvPicPr>
+        <p:blipFill>
+          <a:blip r:embed="rId3"/>
+          <a:stretch>
+            <a:fillRect/>
+          </a:stretch>
+        </p:blipFill>
+        <p:spPr>
+          <a:xfrm>
+            <a:off x="6587647" y="2124075"/>
+            <a:ext cx="5362575" cy="4733925"/>
           </a:xfrm>
           <a:prstGeom prst="rect">
             <a:avLst/>
@@ -11249,7 +11159,7 @@
     </p:spTree>
     <p:extLst>
       <p:ext uri="{BB962C8B-B14F-4D97-AF65-F5344CB8AC3E}">
-        <p14:creationId xmlns:p14="http://schemas.microsoft.com/office/powerpoint/2010/main" val="1239809759"/>
+        <p14:creationId xmlns:p14="http://schemas.microsoft.com/office/powerpoint/2010/main" val="2369293623"/>
       </p:ext>
     </p:extLst>
   </p:cSld>
@@ -11347,21 +11257,21 @@
                 <a:latin typeface="Adobe Fan Heiti Std B" panose="020B0700000000000000" pitchFamily="34" charset="-128"/>
                 <a:ea typeface="Adobe Fan Heiti Std B" panose="020B0700000000000000" pitchFamily="34" charset="-128"/>
               </a:rPr>
-              <a:t>Add animation to rotate Card in </a:t>
+              <a:t>2. Setting </a:t>
             </a:r>
             <a:r>
               <a:rPr lang="en-US" altLang="zh-CN" sz="2400" dirty="0" err="1">
                 <a:latin typeface="Adobe Fan Heiti Std B" panose="020B0700000000000000" pitchFamily="34" charset="-128"/>
                 <a:ea typeface="Adobe Fan Heiti Std B" panose="020B0700000000000000" pitchFamily="34" charset="-128"/>
               </a:rPr>
-              <a:t>GameView</a:t>
+              <a:t>android:stateListAnimator</a:t>
             </a:r>
             <a:r>
               <a:rPr lang="en-US" altLang="zh-CN" sz="2400" dirty="0">
                 <a:latin typeface="Adobe Fan Heiti Std B" panose="020B0700000000000000" pitchFamily="34" charset="-128"/>
                 <a:ea typeface="Adobe Fan Heiti Std B" panose="020B0700000000000000" pitchFamily="34" charset="-128"/>
               </a:rPr>
-              <a:t> Class</a:t>
+              <a:t> in activity_main.xml</a:t>
             </a:r>
             <a:endParaRPr lang="en-US" sz="2400" dirty="0">
               <a:latin typeface="Adobe Fan Heiti Std B" panose="020B0700000000000000" pitchFamily="34" charset="-128"/>
@@ -11372,10 +11282,10 @@
       </p:sp>
       <p:pic>
         <p:nvPicPr>
-          <p:cNvPr id="4" name="Picture 3">
+          <p:cNvPr id="7" name="Picture 6">
             <a:extLst>
               <a:ext uri="{FF2B5EF4-FFF2-40B4-BE49-F238E27FC236}">
-                <a16:creationId xmlns:a16="http://schemas.microsoft.com/office/drawing/2014/main" id="{108DF5BC-BF04-4BC8-A12C-4BA759A2A10E}"/>
+                <a16:creationId xmlns:a16="http://schemas.microsoft.com/office/drawing/2014/main" id="{715CF926-A282-4100-BDA3-551F66D7AAC5}"/>
               </a:ext>
             </a:extLst>
           </p:cNvPr>
@@ -11392,8 +11302,8 @@
         </p:blipFill>
         <p:spPr>
           <a:xfrm>
-            <a:off x="1666976" y="2971795"/>
-            <a:ext cx="8505825" cy="2552700"/>
+            <a:off x="1720469" y="2334892"/>
+            <a:ext cx="8439150" cy="2943225"/>
           </a:xfrm>
           <a:prstGeom prst="rect">
             <a:avLst/>
@@ -11403,7 +11313,7 @@
     </p:spTree>
     <p:extLst>
       <p:ext uri="{BB962C8B-B14F-4D97-AF65-F5344CB8AC3E}">
-        <p14:creationId xmlns:p14="http://schemas.microsoft.com/office/powerpoint/2010/main" val="1680978293"/>
+        <p14:creationId xmlns:p14="http://schemas.microsoft.com/office/powerpoint/2010/main" val="51186027"/>
       </p:ext>
     </p:extLst>
   </p:cSld>
@@ -11501,7 +11411,7 @@
                 <a:latin typeface="Adobe Fan Heiti Std B" panose="020B0700000000000000" pitchFamily="34" charset="-128"/>
                 <a:ea typeface="Adobe Fan Heiti Std B" panose="020B0700000000000000" pitchFamily="34" charset="-128"/>
               </a:rPr>
-              <a:t>Add animation Set for Card in </a:t>
+              <a:t>Add animation to zoom up Card in </a:t>
             </a:r>
             <a:r>
               <a:rPr lang="en-US" altLang="zh-CN" sz="2400" dirty="0" err="1">
@@ -11529,7 +11439,7 @@
           <p:cNvPr id="3" name="Picture 2">
             <a:extLst>
               <a:ext uri="{FF2B5EF4-FFF2-40B4-BE49-F238E27FC236}">
-                <a16:creationId xmlns:a16="http://schemas.microsoft.com/office/drawing/2014/main" id="{849B41A2-B184-44EE-9522-92E4A87BC94C}"/>
+                <a16:creationId xmlns:a16="http://schemas.microsoft.com/office/drawing/2014/main" id="{12C7106C-DC16-416E-BCF2-6F26859A0BE5}"/>
               </a:ext>
             </a:extLst>
           </p:cNvPr>
@@ -11546,8 +11456,8 @@
         </p:blipFill>
         <p:spPr>
           <a:xfrm>
-            <a:off x="1285237" y="2060024"/>
-            <a:ext cx="10344150" cy="3305175"/>
+            <a:off x="1666976" y="2521689"/>
+            <a:ext cx="8115300" cy="2581275"/>
           </a:xfrm>
           <a:prstGeom prst="rect">
             <a:avLst/>
@@ -11557,7 +11467,7 @@
     </p:spTree>
     <p:extLst>
       <p:ext uri="{BB962C8B-B14F-4D97-AF65-F5344CB8AC3E}">
-        <p14:creationId xmlns:p14="http://schemas.microsoft.com/office/powerpoint/2010/main" val="1306669813"/>
+        <p14:creationId xmlns:p14="http://schemas.microsoft.com/office/powerpoint/2010/main" val="1239809759"/>
       </p:ext>
     </p:extLst>
   </p:cSld>
@@ -11655,21 +11565,21 @@
                 <a:latin typeface="Adobe Fan Heiti Std B" panose="020B0700000000000000" pitchFamily="34" charset="-128"/>
                 <a:ea typeface="Adobe Fan Heiti Std B" panose="020B0700000000000000" pitchFamily="34" charset="-128"/>
               </a:rPr>
-              <a:t>Add animation  to “New Game” Button in </a:t>
+              <a:t>Add animation to rotate Card in </a:t>
             </a:r>
             <a:r>
               <a:rPr lang="en-US" altLang="zh-CN" sz="2400" dirty="0" err="1">
                 <a:latin typeface="Adobe Fan Heiti Std B" panose="020B0700000000000000" pitchFamily="34" charset="-128"/>
                 <a:ea typeface="Adobe Fan Heiti Std B" panose="020B0700000000000000" pitchFamily="34" charset="-128"/>
               </a:rPr>
-              <a:t>OnClick</a:t>
+              <a:t>GameView</a:t>
             </a:r>
             <a:r>
               <a:rPr lang="en-US" altLang="zh-CN" sz="2400" dirty="0">
                 <a:latin typeface="Adobe Fan Heiti Std B" panose="020B0700000000000000" pitchFamily="34" charset="-128"/>
                 <a:ea typeface="Adobe Fan Heiti Std B" panose="020B0700000000000000" pitchFamily="34" charset="-128"/>
               </a:rPr>
-              <a:t> Event</a:t>
+              <a:t> Class</a:t>
             </a:r>
             <a:endParaRPr lang="en-US" sz="2400" dirty="0">
               <a:latin typeface="Adobe Fan Heiti Std B" panose="020B0700000000000000" pitchFamily="34" charset="-128"/>
@@ -11683,7 +11593,7 @@
           <p:cNvPr id="4" name="Picture 3">
             <a:extLst>
               <a:ext uri="{FF2B5EF4-FFF2-40B4-BE49-F238E27FC236}">
-                <a16:creationId xmlns:a16="http://schemas.microsoft.com/office/drawing/2014/main" id="{76181867-34E6-4503-A768-6C4C85D07D06}"/>
+                <a16:creationId xmlns:a16="http://schemas.microsoft.com/office/drawing/2014/main" id="{108DF5BC-BF04-4BC8-A12C-4BA759A2A10E}"/>
               </a:ext>
             </a:extLst>
           </p:cNvPr>
@@ -11700,8 +11610,8 @@
         </p:blipFill>
         <p:spPr>
           <a:xfrm>
-            <a:off x="1666976" y="2060024"/>
-            <a:ext cx="9677400" cy="4552950"/>
+            <a:off x="1666976" y="2971795"/>
+            <a:ext cx="8505825" cy="2552700"/>
           </a:xfrm>
           <a:prstGeom prst="rect">
             <a:avLst/>
@@ -11711,7 +11621,7 @@
     </p:spTree>
     <p:extLst>
       <p:ext uri="{BB962C8B-B14F-4D97-AF65-F5344CB8AC3E}">
-        <p14:creationId xmlns:p14="http://schemas.microsoft.com/office/powerpoint/2010/main" val="1587915752"/>
+        <p14:creationId xmlns:p14="http://schemas.microsoft.com/office/powerpoint/2010/main" val="1680978293"/>
       </p:ext>
     </p:extLst>
   </p:cSld>
@@ -11767,16 +11677,12 @@
           <a:lstStyle/>
           <a:p>
             <a:r>
-              <a:rPr lang="en-US">
+              <a:rPr lang="en-US" dirty="0">
                 <a:latin typeface="Adobe Gothic Std B" panose="020B0800000000000000" pitchFamily="34" charset="-128"/>
                 <a:ea typeface="Adobe Gothic Std B" panose="020B0800000000000000" pitchFamily="34" charset="-128"/>
               </a:rPr>
               <a:t>Animation</a:t>
             </a:r>
-            <a:endParaRPr lang="en-US" dirty="0">
-              <a:latin typeface="Adobe Gothic Std B" panose="020B0800000000000000" pitchFamily="34" charset="-128"/>
-              <a:ea typeface="Adobe Gothic Std B" panose="020B0800000000000000" pitchFamily="34" charset="-128"/>
-            </a:endParaRPr>
           </a:p>
         </p:txBody>
       </p:sp>
@@ -11794,8 +11700,8 @@
         </p:nvSpPr>
         <p:spPr>
           <a:xfrm>
-            <a:off x="1720469" y="1635345"/>
-            <a:ext cx="8858048" cy="2308324"/>
+            <a:off x="1666976" y="1333505"/>
+            <a:ext cx="8858048" cy="461665"/>
           </a:xfrm>
           <a:prstGeom prst="rect">
             <a:avLst/>
@@ -11809,32 +11715,25 @@
           <a:lstStyle/>
           <a:p>
             <a:r>
-              <a:rPr lang="en-US" altLang="zh-CN" sz="2400">
+              <a:rPr lang="en-US" altLang="zh-CN" sz="2400" dirty="0">
                 <a:latin typeface="Adobe Fan Heiti Std B" panose="020B0700000000000000" pitchFamily="34" charset="-128"/>
                 <a:ea typeface="Adobe Fan Heiti Std B" panose="020B0700000000000000" pitchFamily="34" charset="-128"/>
               </a:rPr>
-              <a:t>In the project, in order to avoid disturbing the player, I tried my best to add animation effects.</a:t>
-            </a:r>
-          </a:p>
-          <a:p>
-            <a:endParaRPr lang="en-US" altLang="zh-CN" sz="2400">
-              <a:latin typeface="Adobe Fan Heiti Std B" panose="020B0700000000000000" pitchFamily="34" charset="-128"/>
-              <a:ea typeface="Adobe Fan Heiti Std B" panose="020B0700000000000000" pitchFamily="34" charset="-128"/>
-            </a:endParaRPr>
-          </a:p>
-          <a:p>
-            <a:endParaRPr lang="en-US" altLang="zh-CN" sz="2400">
-              <a:latin typeface="Adobe Fan Heiti Std B" panose="020B0700000000000000" pitchFamily="34" charset="-128"/>
-              <a:ea typeface="Adobe Fan Heiti Std B" panose="020B0700000000000000" pitchFamily="34" charset="-128"/>
-            </a:endParaRPr>
-          </a:p>
-          <a:p>
-            <a:r>
-              <a:rPr lang="en-US" altLang="zh-CN" sz="2400">
+              <a:t>Add animation Set for Card in </a:t>
+            </a:r>
+            <a:r>
+              <a:rPr lang="en-US" altLang="zh-CN" sz="2400" dirty="0" err="1">
                 <a:latin typeface="Adobe Fan Heiti Std B" panose="020B0700000000000000" pitchFamily="34" charset="-128"/>
                 <a:ea typeface="Adobe Fan Heiti Std B" panose="020B0700000000000000" pitchFamily="34" charset="-128"/>
               </a:rPr>
-              <a:t>In my Github, there are some other animation effects. If you are interested, you can download it. </a:t>
+              <a:t>GameView</a:t>
+            </a:r>
+            <a:r>
+              <a:rPr lang="en-US" altLang="zh-CN" sz="2400" dirty="0">
+                <a:latin typeface="Adobe Fan Heiti Std B" panose="020B0700000000000000" pitchFamily="34" charset="-128"/>
+                <a:ea typeface="Adobe Fan Heiti Std B" panose="020B0700000000000000" pitchFamily="34" charset="-128"/>
+              </a:rPr>
+              <a:t> Class</a:t>
             </a:r>
             <a:endParaRPr lang="en-US" sz="2400" dirty="0">
               <a:latin typeface="Adobe Fan Heiti Std B" panose="020B0700000000000000" pitchFamily="34" charset="-128"/>
@@ -11843,10 +11742,40 @@
           </a:p>
         </p:txBody>
       </p:sp>
+      <p:pic>
+        <p:nvPicPr>
+          <p:cNvPr id="3" name="Picture 2">
+            <a:extLst>
+              <a:ext uri="{FF2B5EF4-FFF2-40B4-BE49-F238E27FC236}">
+                <a16:creationId xmlns:a16="http://schemas.microsoft.com/office/drawing/2014/main" id="{849B41A2-B184-44EE-9522-92E4A87BC94C}"/>
+              </a:ext>
+            </a:extLst>
+          </p:cNvPr>
+          <p:cNvPicPr>
+            <a:picLocks noChangeAspect="1"/>
+          </p:cNvPicPr>
+          <p:nvPr/>
+        </p:nvPicPr>
+        <p:blipFill>
+          <a:blip r:embed="rId2"/>
+          <a:stretch>
+            <a:fillRect/>
+          </a:stretch>
+        </p:blipFill>
+        <p:spPr>
+          <a:xfrm>
+            <a:off x="1285237" y="2060024"/>
+            <a:ext cx="10344150" cy="3305175"/>
+          </a:xfrm>
+          <a:prstGeom prst="rect">
+            <a:avLst/>
+          </a:prstGeom>
+        </p:spPr>
+      </p:pic>
     </p:spTree>
     <p:extLst>
       <p:ext uri="{BB962C8B-B14F-4D97-AF65-F5344CB8AC3E}">
-        <p14:creationId xmlns:p14="http://schemas.microsoft.com/office/powerpoint/2010/main" val="2406071785"/>
+        <p14:creationId xmlns:p14="http://schemas.microsoft.com/office/powerpoint/2010/main" val="1306669813"/>
       </p:ext>
     </p:extLst>
   </p:cSld>
@@ -11891,12 +11820,14 @@
         </p:nvSpPr>
         <p:spPr>
           <a:xfrm>
-            <a:off x="1728747" y="407424"/>
-            <a:ext cx="8911687" cy="1280890"/>
-          </a:xfrm>
-        </p:spPr>
-        <p:txBody>
-          <a:bodyPr/>
+            <a:off x="1720469" y="606986"/>
+            <a:ext cx="9061010" cy="726519"/>
+          </a:xfrm>
+        </p:spPr>
+        <p:txBody>
+          <a:bodyPr>
+            <a:normAutofit/>
+          </a:bodyPr>
           <a:lstStyle/>
           <a:p>
             <a:r>
@@ -11904,17 +11835,73 @@
                 <a:latin typeface="Adobe Gothic Std B" panose="020B0800000000000000" pitchFamily="34" charset="-128"/>
                 <a:ea typeface="Adobe Gothic Std B" panose="020B0800000000000000" pitchFamily="34" charset="-128"/>
               </a:rPr>
-              <a:t>AlterDialog</a:t>
-            </a:r>
+              <a:t>Animation</a:t>
+            </a:r>
+          </a:p>
+        </p:txBody>
+      </p:sp>
+      <p:sp>
+        <p:nvSpPr>
+          <p:cNvPr id="5" name="TextBox 4">
+            <a:extLst>
+              <a:ext uri="{FF2B5EF4-FFF2-40B4-BE49-F238E27FC236}">
+                <a16:creationId xmlns:a16="http://schemas.microsoft.com/office/drawing/2014/main" id="{4EF13458-918B-479C-9167-62849C1FAA87}"/>
+              </a:ext>
+            </a:extLst>
+          </p:cNvPr>
+          <p:cNvSpPr txBox="1"/>
+          <p:nvPr/>
+        </p:nvSpPr>
+        <p:spPr>
+          <a:xfrm>
+            <a:off x="1666976" y="1333505"/>
+            <a:ext cx="8858048" cy="461665"/>
+          </a:xfrm>
+          <a:prstGeom prst="rect">
+            <a:avLst/>
+          </a:prstGeom>
+          <a:noFill/>
+        </p:spPr>
+        <p:txBody>
+          <a:bodyPr wrap="square" rtlCol="0">
+            <a:spAutoFit/>
+          </a:bodyPr>
+          <a:lstStyle/>
+          <a:p>
+            <a:r>
+              <a:rPr lang="en-US" altLang="zh-CN" sz="2400" dirty="0">
+                <a:latin typeface="Adobe Fan Heiti Std B" panose="020B0700000000000000" pitchFamily="34" charset="-128"/>
+                <a:ea typeface="Adobe Fan Heiti Std B" panose="020B0700000000000000" pitchFamily="34" charset="-128"/>
+              </a:rPr>
+              <a:t>Add animation  to “New Game” Button in </a:t>
+            </a:r>
+            <a:r>
+              <a:rPr lang="en-US" altLang="zh-CN" sz="2400" dirty="0" err="1">
+                <a:latin typeface="Adobe Fan Heiti Std B" panose="020B0700000000000000" pitchFamily="34" charset="-128"/>
+                <a:ea typeface="Adobe Fan Heiti Std B" panose="020B0700000000000000" pitchFamily="34" charset="-128"/>
+              </a:rPr>
+              <a:t>OnClick</a:t>
+            </a:r>
+            <a:r>
+              <a:rPr lang="en-US" altLang="zh-CN" sz="2400" dirty="0">
+                <a:latin typeface="Adobe Fan Heiti Std B" panose="020B0700000000000000" pitchFamily="34" charset="-128"/>
+                <a:ea typeface="Adobe Fan Heiti Std B" panose="020B0700000000000000" pitchFamily="34" charset="-128"/>
+              </a:rPr>
+              <a:t> Event</a:t>
+            </a:r>
+            <a:endParaRPr lang="en-US" sz="2400" dirty="0">
+              <a:latin typeface="Adobe Fan Heiti Std B" panose="020B0700000000000000" pitchFamily="34" charset="-128"/>
+              <a:ea typeface="Adobe Fan Heiti Std B" panose="020B0700000000000000" pitchFamily="34" charset="-128"/>
+            </a:endParaRPr>
           </a:p>
         </p:txBody>
       </p:sp>
       <p:pic>
         <p:nvPicPr>
-          <p:cNvPr id="6" name="Picture 5">
+          <p:cNvPr id="4" name="Picture 3">
             <a:extLst>
               <a:ext uri="{FF2B5EF4-FFF2-40B4-BE49-F238E27FC236}">
-                <a16:creationId xmlns:a16="http://schemas.microsoft.com/office/drawing/2014/main" id="{DB9436F3-378C-4316-B179-5AF77A306400}"/>
+                <a16:creationId xmlns:a16="http://schemas.microsoft.com/office/drawing/2014/main" id="{76181867-34E6-4503-A768-6C4C85D07D06}"/>
               </a:ext>
             </a:extLst>
           </p:cNvPr>
@@ -11931,151 +11918,18 @@
         </p:blipFill>
         <p:spPr>
           <a:xfrm>
-            <a:off x="1728747" y="2049215"/>
-            <a:ext cx="10491926" cy="3114675"/>
+            <a:off x="1666976" y="2060024"/>
+            <a:ext cx="9677400" cy="4552950"/>
           </a:xfrm>
           <a:prstGeom prst="rect">
             <a:avLst/>
           </a:prstGeom>
         </p:spPr>
       </p:pic>
-      <p:sp>
-        <p:nvSpPr>
-          <p:cNvPr id="7" name="TextBox 6">
-            <a:extLst>
-              <a:ext uri="{FF2B5EF4-FFF2-40B4-BE49-F238E27FC236}">
-                <a16:creationId xmlns:a16="http://schemas.microsoft.com/office/drawing/2014/main" id="{6807B085-7314-4226-8A55-BD0A2EB2F63A}"/>
-              </a:ext>
-            </a:extLst>
-          </p:cNvPr>
-          <p:cNvSpPr txBox="1"/>
-          <p:nvPr/>
-        </p:nvSpPr>
-        <p:spPr>
-          <a:xfrm>
-            <a:off x="1728747" y="1150385"/>
-            <a:ext cx="8858048" cy="830997"/>
-          </a:xfrm>
-          <a:prstGeom prst="rect">
-            <a:avLst/>
-          </a:prstGeom>
-          <a:noFill/>
-        </p:spPr>
-        <p:txBody>
-          <a:bodyPr wrap="square" rtlCol="0">
-            <a:spAutoFit/>
-          </a:bodyPr>
-          <a:lstStyle/>
-          <a:p>
-            <a:r>
-              <a:rPr lang="en-US" altLang="zh-CN" sz="2400" dirty="0">
-                <a:latin typeface="Adobe Fan Heiti Std B" panose="020B0700000000000000" pitchFamily="34" charset="-128"/>
-                <a:ea typeface="Adobe Fan Heiti Std B" panose="020B0700000000000000" pitchFamily="34" charset="-128"/>
-              </a:rPr>
-              <a:t>Create a method and add these code. Call this method when you want to display Dialog</a:t>
-            </a:r>
-            <a:endParaRPr lang="en-US" sz="2400" dirty="0">
-              <a:latin typeface="Adobe Fan Heiti Std B" panose="020B0700000000000000" pitchFamily="34" charset="-128"/>
-              <a:ea typeface="Adobe Fan Heiti Std B" panose="020B0700000000000000" pitchFamily="34" charset="-128"/>
-            </a:endParaRPr>
-          </a:p>
-        </p:txBody>
-      </p:sp>
-      <p:sp>
-        <p:nvSpPr>
-          <p:cNvPr id="8" name="TextBox 7">
-            <a:extLst>
-              <a:ext uri="{FF2B5EF4-FFF2-40B4-BE49-F238E27FC236}">
-                <a16:creationId xmlns:a16="http://schemas.microsoft.com/office/drawing/2014/main" id="{18E98230-4EA5-4AE4-8A22-A4DFC52FE47F}"/>
-              </a:ext>
-            </a:extLst>
-          </p:cNvPr>
-          <p:cNvSpPr txBox="1"/>
-          <p:nvPr/>
-        </p:nvSpPr>
-        <p:spPr>
-          <a:xfrm>
-            <a:off x="1338129" y="5812509"/>
-            <a:ext cx="10491925" cy="461665"/>
-          </a:xfrm>
-          <a:prstGeom prst="rect">
-            <a:avLst/>
-          </a:prstGeom>
-          <a:noFill/>
-        </p:spPr>
-        <p:txBody>
-          <a:bodyPr wrap="square" rtlCol="0">
-            <a:spAutoFit/>
-          </a:bodyPr>
-          <a:lstStyle/>
-          <a:p>
-            <a:r>
-              <a:rPr lang="en-US" sz="2400" dirty="0">
-                <a:solidFill>
-                  <a:schemeClr val="bg1">
-                    <a:lumMod val="50000"/>
-                  </a:schemeClr>
-                </a:solidFill>
-                <a:latin typeface="Adobe Fan Heiti Std B" panose="020B0700000000000000" pitchFamily="34" charset="-128"/>
-                <a:ea typeface="Adobe Fan Heiti Std B" panose="020B0700000000000000" pitchFamily="34" charset="-128"/>
-              </a:rPr>
-              <a:t>Tips: If you do not want your dialog lose the focus, use </a:t>
-            </a:r>
-            <a:r>
-              <a:rPr lang="en-US" sz="2400" dirty="0" err="1">
-                <a:solidFill>
-                  <a:schemeClr val="bg1">
-                    <a:lumMod val="50000"/>
-                  </a:schemeClr>
-                </a:solidFill>
-                <a:latin typeface="Adobe Fan Heiti Std B" panose="020B0700000000000000" pitchFamily="34" charset="-128"/>
-                <a:ea typeface="Adobe Fan Heiti Std B" panose="020B0700000000000000" pitchFamily="34" charset="-128"/>
-              </a:rPr>
-              <a:t>setCancelable</a:t>
-            </a:r>
-            <a:r>
-              <a:rPr lang="en-US" sz="2400" dirty="0">
-                <a:solidFill>
-                  <a:schemeClr val="bg1">
-                    <a:lumMod val="50000"/>
-                  </a:schemeClr>
-                </a:solidFill>
-                <a:latin typeface="Adobe Fan Heiti Std B" panose="020B0700000000000000" pitchFamily="34" charset="-128"/>
-                <a:ea typeface="Adobe Fan Heiti Std B" panose="020B0700000000000000" pitchFamily="34" charset="-128"/>
-              </a:rPr>
-              <a:t>(</a:t>
-            </a:r>
-            <a:r>
-              <a:rPr lang="en-US" sz="2400" dirty="0" err="1">
-                <a:solidFill>
-                  <a:schemeClr val="bg1">
-                    <a:lumMod val="50000"/>
-                  </a:schemeClr>
-                </a:solidFill>
-                <a:latin typeface="Adobe Fan Heiti Std B" panose="020B0700000000000000" pitchFamily="34" charset="-128"/>
-                <a:ea typeface="Adobe Fan Heiti Std B" panose="020B0700000000000000" pitchFamily="34" charset="-128"/>
-              </a:rPr>
-              <a:t>fasle</a:t>
-            </a:r>
-            <a:r>
-              <a:rPr lang="en-US" sz="2400" dirty="0">
-                <a:solidFill>
-                  <a:schemeClr val="bg1">
-                    <a:lumMod val="50000"/>
-                  </a:schemeClr>
-                </a:solidFill>
-                <a:latin typeface="Adobe Fan Heiti Std B" panose="020B0700000000000000" pitchFamily="34" charset="-128"/>
-                <a:ea typeface="Adobe Fan Heiti Std B" panose="020B0700000000000000" pitchFamily="34" charset="-128"/>
-              </a:rPr>
-              <a:t>)</a:t>
-            </a:r>
-          </a:p>
-        </p:txBody>
-      </p:sp>
     </p:spTree>
     <p:extLst>
       <p:ext uri="{BB962C8B-B14F-4D97-AF65-F5344CB8AC3E}">
-        <p14:creationId xmlns:p14="http://schemas.microsoft.com/office/powerpoint/2010/main" val="218760216"/>
+        <p14:creationId xmlns:p14="http://schemas.microsoft.com/office/powerpoint/2010/main" val="1587915752"/>
       </p:ext>
     </p:extLst>
   </p:cSld>
@@ -12133,59 +11987,17 @@
                 <a:latin typeface="Adobe Gothic Std B" panose="020B0800000000000000" pitchFamily="34" charset="-128"/>
                 <a:ea typeface="Adobe Gothic Std B" panose="020B0800000000000000" pitchFamily="34" charset="-128"/>
               </a:rPr>
-              <a:t>Notification</a:t>
-            </a:r>
-          </a:p>
-        </p:txBody>
-      </p:sp>
-      <p:sp>
-        <p:nvSpPr>
-          <p:cNvPr id="7" name="TextBox 6">
+              <a:t>AlterDialog</a:t>
+            </a:r>
+          </a:p>
+        </p:txBody>
+      </p:sp>
+      <p:pic>
+        <p:nvPicPr>
+          <p:cNvPr id="6" name="Picture 5">
             <a:extLst>
               <a:ext uri="{FF2B5EF4-FFF2-40B4-BE49-F238E27FC236}">
-                <a16:creationId xmlns:a16="http://schemas.microsoft.com/office/drawing/2014/main" id="{6807B085-7314-4226-8A55-BD0A2EB2F63A}"/>
-              </a:ext>
-            </a:extLst>
-          </p:cNvPr>
-          <p:cNvSpPr txBox="1"/>
-          <p:nvPr/>
-        </p:nvSpPr>
-        <p:spPr>
-          <a:xfrm>
-            <a:off x="1728747" y="1037767"/>
-            <a:ext cx="8858048" cy="830997"/>
-          </a:xfrm>
-          <a:prstGeom prst="rect">
-            <a:avLst/>
-          </a:prstGeom>
-          <a:noFill/>
-        </p:spPr>
-        <p:txBody>
-          <a:bodyPr wrap="square" rtlCol="0">
-            <a:spAutoFit/>
-          </a:bodyPr>
-          <a:lstStyle/>
-          <a:p>
-            <a:r>
-              <a:rPr lang="en-US" altLang="zh-CN" sz="2400" dirty="0">
-                <a:latin typeface="Adobe Fan Heiti Std B" panose="020B0700000000000000" pitchFamily="34" charset="-128"/>
-                <a:ea typeface="Adobe Fan Heiti Std B" panose="020B0700000000000000" pitchFamily="34" charset="-128"/>
-              </a:rPr>
-              <a:t>Create a method and add these code. Call this method when you want to display Notification</a:t>
-            </a:r>
-            <a:endParaRPr lang="en-US" sz="2400" dirty="0">
-              <a:latin typeface="Adobe Fan Heiti Std B" panose="020B0700000000000000" pitchFamily="34" charset="-128"/>
-              <a:ea typeface="Adobe Fan Heiti Std B" panose="020B0700000000000000" pitchFamily="34" charset="-128"/>
-            </a:endParaRPr>
-          </a:p>
-        </p:txBody>
-      </p:sp>
-      <p:pic>
-        <p:nvPicPr>
-          <p:cNvPr id="3" name="Picture 2">
-            <a:extLst>
-              <a:ext uri="{FF2B5EF4-FFF2-40B4-BE49-F238E27FC236}">
-                <a16:creationId xmlns:a16="http://schemas.microsoft.com/office/drawing/2014/main" id="{8B84FEED-92B5-49DA-9915-B7D66361E6A4}"/>
+                <a16:creationId xmlns:a16="http://schemas.microsoft.com/office/drawing/2014/main" id="{DB9436F3-378C-4316-B179-5AF77A306400}"/>
               </a:ext>
             </a:extLst>
           </p:cNvPr>
@@ -12202,18 +12014,151 @@
         </p:blipFill>
         <p:spPr>
           <a:xfrm>
-            <a:off x="1728746" y="2017621"/>
-            <a:ext cx="8911687" cy="4010640"/>
+            <a:off x="1728747" y="2049215"/>
+            <a:ext cx="10491926" cy="3114675"/>
           </a:xfrm>
           <a:prstGeom prst="rect">
             <a:avLst/>
           </a:prstGeom>
         </p:spPr>
       </p:pic>
+      <p:sp>
+        <p:nvSpPr>
+          <p:cNvPr id="7" name="TextBox 6">
+            <a:extLst>
+              <a:ext uri="{FF2B5EF4-FFF2-40B4-BE49-F238E27FC236}">
+                <a16:creationId xmlns:a16="http://schemas.microsoft.com/office/drawing/2014/main" id="{6807B085-7314-4226-8A55-BD0A2EB2F63A}"/>
+              </a:ext>
+            </a:extLst>
+          </p:cNvPr>
+          <p:cNvSpPr txBox="1"/>
+          <p:nvPr/>
+        </p:nvSpPr>
+        <p:spPr>
+          <a:xfrm>
+            <a:off x="1728747" y="1150385"/>
+            <a:ext cx="8858048" cy="830997"/>
+          </a:xfrm>
+          <a:prstGeom prst="rect">
+            <a:avLst/>
+          </a:prstGeom>
+          <a:noFill/>
+        </p:spPr>
+        <p:txBody>
+          <a:bodyPr wrap="square" rtlCol="0">
+            <a:spAutoFit/>
+          </a:bodyPr>
+          <a:lstStyle/>
+          <a:p>
+            <a:r>
+              <a:rPr lang="en-US" altLang="zh-CN" sz="2400" dirty="0">
+                <a:latin typeface="Adobe Fan Heiti Std B" panose="020B0700000000000000" pitchFamily="34" charset="-128"/>
+                <a:ea typeface="Adobe Fan Heiti Std B" panose="020B0700000000000000" pitchFamily="34" charset="-128"/>
+              </a:rPr>
+              <a:t>Create a method and add these code. Call this method when you want to display Dialog</a:t>
+            </a:r>
+            <a:endParaRPr lang="en-US" sz="2400" dirty="0">
+              <a:latin typeface="Adobe Fan Heiti Std B" panose="020B0700000000000000" pitchFamily="34" charset="-128"/>
+              <a:ea typeface="Adobe Fan Heiti Std B" panose="020B0700000000000000" pitchFamily="34" charset="-128"/>
+            </a:endParaRPr>
+          </a:p>
+        </p:txBody>
+      </p:sp>
+      <p:sp>
+        <p:nvSpPr>
+          <p:cNvPr id="8" name="TextBox 7">
+            <a:extLst>
+              <a:ext uri="{FF2B5EF4-FFF2-40B4-BE49-F238E27FC236}">
+                <a16:creationId xmlns:a16="http://schemas.microsoft.com/office/drawing/2014/main" id="{18E98230-4EA5-4AE4-8A22-A4DFC52FE47F}"/>
+              </a:ext>
+            </a:extLst>
+          </p:cNvPr>
+          <p:cNvSpPr txBox="1"/>
+          <p:nvPr/>
+        </p:nvSpPr>
+        <p:spPr>
+          <a:xfrm>
+            <a:off x="1338129" y="5812509"/>
+            <a:ext cx="10491925" cy="461665"/>
+          </a:xfrm>
+          <a:prstGeom prst="rect">
+            <a:avLst/>
+          </a:prstGeom>
+          <a:noFill/>
+        </p:spPr>
+        <p:txBody>
+          <a:bodyPr wrap="square" rtlCol="0">
+            <a:spAutoFit/>
+          </a:bodyPr>
+          <a:lstStyle/>
+          <a:p>
+            <a:r>
+              <a:rPr lang="en-US" sz="2400" dirty="0">
+                <a:solidFill>
+                  <a:schemeClr val="bg1">
+                    <a:lumMod val="50000"/>
+                  </a:schemeClr>
+                </a:solidFill>
+                <a:latin typeface="Adobe Fan Heiti Std B" panose="020B0700000000000000" pitchFamily="34" charset="-128"/>
+                <a:ea typeface="Adobe Fan Heiti Std B" panose="020B0700000000000000" pitchFamily="34" charset="-128"/>
+              </a:rPr>
+              <a:t>Tips: If you do not want your dialog lose the focus, use </a:t>
+            </a:r>
+            <a:r>
+              <a:rPr lang="en-US" sz="2400" dirty="0" err="1">
+                <a:solidFill>
+                  <a:schemeClr val="bg1">
+                    <a:lumMod val="50000"/>
+                  </a:schemeClr>
+                </a:solidFill>
+                <a:latin typeface="Adobe Fan Heiti Std B" panose="020B0700000000000000" pitchFamily="34" charset="-128"/>
+                <a:ea typeface="Adobe Fan Heiti Std B" panose="020B0700000000000000" pitchFamily="34" charset="-128"/>
+              </a:rPr>
+              <a:t>setCancelable</a:t>
+            </a:r>
+            <a:r>
+              <a:rPr lang="en-US" sz="2400" dirty="0">
+                <a:solidFill>
+                  <a:schemeClr val="bg1">
+                    <a:lumMod val="50000"/>
+                  </a:schemeClr>
+                </a:solidFill>
+                <a:latin typeface="Adobe Fan Heiti Std B" panose="020B0700000000000000" pitchFamily="34" charset="-128"/>
+                <a:ea typeface="Adobe Fan Heiti Std B" panose="020B0700000000000000" pitchFamily="34" charset="-128"/>
+              </a:rPr>
+              <a:t>(</a:t>
+            </a:r>
+            <a:r>
+              <a:rPr lang="en-US" sz="2400" dirty="0" err="1">
+                <a:solidFill>
+                  <a:schemeClr val="bg1">
+                    <a:lumMod val="50000"/>
+                  </a:schemeClr>
+                </a:solidFill>
+                <a:latin typeface="Adobe Fan Heiti Std B" panose="020B0700000000000000" pitchFamily="34" charset="-128"/>
+                <a:ea typeface="Adobe Fan Heiti Std B" panose="020B0700000000000000" pitchFamily="34" charset="-128"/>
+              </a:rPr>
+              <a:t>fasle</a:t>
+            </a:r>
+            <a:r>
+              <a:rPr lang="en-US" sz="2400" dirty="0">
+                <a:solidFill>
+                  <a:schemeClr val="bg1">
+                    <a:lumMod val="50000"/>
+                  </a:schemeClr>
+                </a:solidFill>
+                <a:latin typeface="Adobe Fan Heiti Std B" panose="020B0700000000000000" pitchFamily="34" charset="-128"/>
+                <a:ea typeface="Adobe Fan Heiti Std B" panose="020B0700000000000000" pitchFamily="34" charset="-128"/>
+              </a:rPr>
+              <a:t>)</a:t>
+            </a:r>
+          </a:p>
+        </p:txBody>
+      </p:sp>
     </p:spTree>
     <p:extLst>
       <p:ext uri="{BB962C8B-B14F-4D97-AF65-F5344CB8AC3E}">
-        <p14:creationId xmlns:p14="http://schemas.microsoft.com/office/powerpoint/2010/main" val="3525737358"/>
+        <p14:creationId xmlns:p14="http://schemas.microsoft.com/office/powerpoint/2010/main" val="218760216"/>
       </p:ext>
     </p:extLst>
   </p:cSld>
@@ -12290,6 +12235,144 @@
         </p:nvSpPr>
         <p:spPr>
           <a:xfrm>
+            <a:off x="1728747" y="1037767"/>
+            <a:ext cx="8858048" cy="830997"/>
+          </a:xfrm>
+          <a:prstGeom prst="rect">
+            <a:avLst/>
+          </a:prstGeom>
+          <a:noFill/>
+        </p:spPr>
+        <p:txBody>
+          <a:bodyPr wrap="square" rtlCol="0">
+            <a:spAutoFit/>
+          </a:bodyPr>
+          <a:lstStyle/>
+          <a:p>
+            <a:r>
+              <a:rPr lang="en-US" altLang="zh-CN" sz="2400" dirty="0">
+                <a:latin typeface="Adobe Fan Heiti Std B" panose="020B0700000000000000" pitchFamily="34" charset="-128"/>
+                <a:ea typeface="Adobe Fan Heiti Std B" panose="020B0700000000000000" pitchFamily="34" charset="-128"/>
+              </a:rPr>
+              <a:t>Create a method and add these code. Call this method when you want to display Notification</a:t>
+            </a:r>
+            <a:endParaRPr lang="en-US" sz="2400" dirty="0">
+              <a:latin typeface="Adobe Fan Heiti Std B" panose="020B0700000000000000" pitchFamily="34" charset="-128"/>
+              <a:ea typeface="Adobe Fan Heiti Std B" panose="020B0700000000000000" pitchFamily="34" charset="-128"/>
+            </a:endParaRPr>
+          </a:p>
+        </p:txBody>
+      </p:sp>
+      <p:pic>
+        <p:nvPicPr>
+          <p:cNvPr id="3" name="Picture 2">
+            <a:extLst>
+              <a:ext uri="{FF2B5EF4-FFF2-40B4-BE49-F238E27FC236}">
+                <a16:creationId xmlns:a16="http://schemas.microsoft.com/office/drawing/2014/main" id="{8B84FEED-92B5-49DA-9915-B7D66361E6A4}"/>
+              </a:ext>
+            </a:extLst>
+          </p:cNvPr>
+          <p:cNvPicPr>
+            <a:picLocks noChangeAspect="1"/>
+          </p:cNvPicPr>
+          <p:nvPr/>
+        </p:nvPicPr>
+        <p:blipFill>
+          <a:blip r:embed="rId2"/>
+          <a:stretch>
+            <a:fillRect/>
+          </a:stretch>
+        </p:blipFill>
+        <p:spPr>
+          <a:xfrm>
+            <a:off x="1728746" y="2017621"/>
+            <a:ext cx="8911687" cy="4010640"/>
+          </a:xfrm>
+          <a:prstGeom prst="rect">
+            <a:avLst/>
+          </a:prstGeom>
+        </p:spPr>
+      </p:pic>
+    </p:spTree>
+    <p:extLst>
+      <p:ext uri="{BB962C8B-B14F-4D97-AF65-F5344CB8AC3E}">
+        <p14:creationId xmlns:p14="http://schemas.microsoft.com/office/powerpoint/2010/main" val="3525737358"/>
+      </p:ext>
+    </p:extLst>
+  </p:cSld>
+  <p:clrMapOvr>
+    <a:masterClrMapping/>
+  </p:clrMapOvr>
+</p:sld>
+</file>
+
+<file path=ppt/slides/slide28.xml><?xml version="1.0" encoding="utf-8"?>
+<p:sld xmlns:a="http://schemas.openxmlformats.org/drawingml/2006/main" xmlns:r="http://schemas.openxmlformats.org/officeDocument/2006/relationships" xmlns:p="http://schemas.openxmlformats.org/presentationml/2006/main">
+  <p:cSld>
+    <p:spTree>
+      <p:nvGrpSpPr>
+        <p:cNvPr id="1" name=""/>
+        <p:cNvGrpSpPr/>
+        <p:nvPr/>
+      </p:nvGrpSpPr>
+      <p:grpSpPr>
+        <a:xfrm>
+          <a:off x="0" y="0"/>
+          <a:ext cx="0" cy="0"/>
+          <a:chOff x="0" y="0"/>
+          <a:chExt cx="0" cy="0"/>
+        </a:xfrm>
+      </p:grpSpPr>
+      <p:sp>
+        <p:nvSpPr>
+          <p:cNvPr id="2" name="Title 1">
+            <a:extLst>
+              <a:ext uri="{FF2B5EF4-FFF2-40B4-BE49-F238E27FC236}">
+                <a16:creationId xmlns:a16="http://schemas.microsoft.com/office/drawing/2014/main" id="{FDE5CA10-4382-4FBE-8743-226E74A3B3CA}"/>
+              </a:ext>
+            </a:extLst>
+          </p:cNvPr>
+          <p:cNvSpPr>
+            <a:spLocks noGrp="1"/>
+          </p:cNvSpPr>
+          <p:nvPr>
+            <p:ph type="title"/>
+          </p:nvPr>
+        </p:nvSpPr>
+        <p:spPr>
+          <a:xfrm>
+            <a:off x="1728747" y="407424"/>
+            <a:ext cx="8911687" cy="1280890"/>
+          </a:xfrm>
+        </p:spPr>
+        <p:txBody>
+          <a:bodyPr/>
+          <a:lstStyle/>
+          <a:p>
+            <a:r>
+              <a:rPr lang="en-US" dirty="0">
+                <a:latin typeface="Adobe Gothic Std B" panose="020B0800000000000000" pitchFamily="34" charset="-128"/>
+                <a:ea typeface="Adobe Gothic Std B" panose="020B0800000000000000" pitchFamily="34" charset="-128"/>
+              </a:rPr>
+              <a:t>Notification</a:t>
+            </a:r>
+          </a:p>
+        </p:txBody>
+      </p:sp>
+      <p:sp>
+        <p:nvSpPr>
+          <p:cNvPr id="7" name="TextBox 6">
+            <a:extLst>
+              <a:ext uri="{FF2B5EF4-FFF2-40B4-BE49-F238E27FC236}">
+                <a16:creationId xmlns:a16="http://schemas.microsoft.com/office/drawing/2014/main" id="{6807B085-7314-4226-8A55-BD0A2EB2F63A}"/>
+              </a:ext>
+            </a:extLst>
+          </p:cNvPr>
+          <p:cNvSpPr txBox="1"/>
+          <p:nvPr/>
+        </p:nvSpPr>
+        <p:spPr>
+          <a:xfrm>
             <a:off x="1728747" y="1533046"/>
             <a:ext cx="8858048" cy="461665"/>
           </a:xfrm>
@@ -12361,7 +12444,7 @@
 </p:sld>
 </file>
 
-<file path=ppt/slides/slide28.xml><?xml version="1.0" encoding="utf-8"?>
+<file path=ppt/slides/slide29.xml><?xml version="1.0" encoding="utf-8"?>
 <p:sld xmlns:a="http://schemas.openxmlformats.org/drawingml/2006/main" xmlns:r="http://schemas.openxmlformats.org/officeDocument/2006/relationships" xmlns:p="http://schemas.openxmlformats.org/presentationml/2006/main">
   <p:cSld>
     <p:spTree>
@@ -12452,6 +12535,41 @@
           </a:p>
         </p:txBody>
       </p:sp>
+      <p:sp>
+        <p:nvSpPr>
+          <p:cNvPr id="24" name="Subtitle 2">
+            <a:extLst>
+              <a:ext uri="{FF2B5EF4-FFF2-40B4-BE49-F238E27FC236}">
+                <a16:creationId xmlns:a16="http://schemas.microsoft.com/office/drawing/2014/main" id="{E6E91134-E7D4-43DD-B92F-5345961C2348}"/>
+              </a:ext>
+            </a:extLst>
+          </p:cNvPr>
+          <p:cNvSpPr>
+            <a:spLocks noGrp="1"/>
+          </p:cNvSpPr>
+          <p:nvPr>
+            <p:ph type="subTitle" idx="1"/>
+          </p:nvPr>
+        </p:nvSpPr>
+        <p:spPr>
+          <a:xfrm>
+            <a:off x="2589213" y="4777379"/>
+            <a:ext cx="8915399" cy="1126283"/>
+          </a:xfrm>
+        </p:spPr>
+        <p:txBody>
+          <a:bodyPr>
+            <a:normAutofit/>
+          </a:bodyPr>
+          <a:lstStyle/>
+          <a:p>
+            <a:r>
+              <a:rPr lang="en-US" sz="3200" dirty="0"/>
+              <a:t>jj.jianjiao@gmail.com</a:t>
+            </a:r>
+          </a:p>
+        </p:txBody>
+      </p:sp>
     </p:spTree>
     <p:extLst>
       <p:ext uri="{BB962C8B-B14F-4D97-AF65-F5344CB8AC3E}">
@@ -12504,16 +12622,12 @@
           <a:lstStyle/>
           <a:p>
             <a:r>
-              <a:rPr lang="en-US" dirty="0" err="1">
+              <a:rPr lang="en-US" dirty="0">
                 <a:latin typeface="Adobe Gothic Std B" panose="020B0800000000000000" pitchFamily="34" charset="-128"/>
                 <a:ea typeface="Adobe Gothic Std B" panose="020B0800000000000000" pitchFamily="34" charset="-128"/>
               </a:rPr>
-              <a:t>GridLayout</a:t>
-            </a:r>
-            <a:endParaRPr lang="en-US" dirty="0">
-              <a:latin typeface="Adobe Gothic Std B" panose="020B0800000000000000" pitchFamily="34" charset="-128"/>
-              <a:ea typeface="Adobe Gothic Std B" panose="020B0800000000000000" pitchFamily="34" charset="-128"/>
-            </a:endParaRPr>
+              <a:t>What do I need ?</a:t>
+            </a:r>
           </a:p>
         </p:txBody>
       </p:sp>
@@ -12539,29 +12653,48 @@
           <a:lstStyle/>
           <a:p>
             <a:r>
+              <a:rPr lang="en-US" sz="3200" dirty="0" err="1">
+                <a:latin typeface="Adobe Devanagari" panose="02040503050201020203" pitchFamily="18" charset="0"/>
+                <a:cs typeface="Adobe Devanagari" panose="02040503050201020203" pitchFamily="18" charset="0"/>
+              </a:rPr>
+              <a:t>GridLayout</a:t>
+            </a:r>
+            <a:r>
               <a:rPr lang="en-US" sz="3200" dirty="0">
                 <a:latin typeface="Adobe Devanagari" panose="02040503050201020203" pitchFamily="18" charset="0"/>
                 <a:cs typeface="Adobe Devanagari" panose="02040503050201020203" pitchFamily="18" charset="0"/>
               </a:rPr>
-              <a:t>Set the arrangement of components in the layout</a:t>
-            </a:r>
-          </a:p>
-          <a:p>
+              <a:t> </a:t>
+            </a:r>
+            <a:r>
+              <a:rPr lang="en-US" altLang="zh-CN" sz="3200" dirty="0">
+                <a:latin typeface="Adobe Devanagari" panose="02040503050201020203" pitchFamily="18" charset="0"/>
+                <a:cs typeface="Adobe Devanagari" panose="02040503050201020203" pitchFamily="18" charset="0"/>
+              </a:rPr>
+              <a:t>to design</a:t>
+            </a:r>
             <a:r>
               <a:rPr lang="en-US" sz="3200" dirty="0">
                 <a:latin typeface="Adobe Devanagari" panose="02040503050201020203" pitchFamily="18" charset="0"/>
                 <a:cs typeface="Adobe Devanagari" panose="02040503050201020203" pitchFamily="18" charset="0"/>
               </a:rPr>
-              <a:t>Customize how many rows and columns</a:t>
-            </a:r>
-          </a:p>
-          <a:p>
+              <a:t> Gameboard</a:t>
+            </a:r>
+          </a:p>
+          <a:p>
+            <a:r>
+              <a:rPr lang="en-US" sz="3200" dirty="0" err="1">
+                <a:latin typeface="Adobe Devanagari" panose="02040503050201020203" pitchFamily="18" charset="0"/>
+                <a:cs typeface="Adobe Devanagari" panose="02040503050201020203" pitchFamily="18" charset="0"/>
+              </a:rPr>
+              <a:t>FrameLayout</a:t>
+            </a:r>
             <a:r>
               <a:rPr lang="en-US" sz="3200" dirty="0">
                 <a:latin typeface="Adobe Devanagari" panose="02040503050201020203" pitchFamily="18" charset="0"/>
                 <a:cs typeface="Adobe Devanagari" panose="02040503050201020203" pitchFamily="18" charset="0"/>
               </a:rPr>
-              <a:t>Set the component to be in a row and column</a:t>
+              <a:t> to design Card</a:t>
             </a:r>
           </a:p>
           <a:p>
@@ -12570,8 +12703,35 @@
                 <a:latin typeface="Adobe Devanagari" panose="02040503050201020203" pitchFamily="18" charset="0"/>
                 <a:cs typeface="Adobe Devanagari" panose="02040503050201020203" pitchFamily="18" charset="0"/>
               </a:rPr>
-              <a:t>Set the component to span several rows or columns</a:t>
-            </a:r>
+              <a:t>Animation to achieve Card movement effect </a:t>
+            </a:r>
+          </a:p>
+          <a:p>
+            <a:r>
+              <a:rPr lang="en-US" sz="3200" dirty="0" err="1">
+                <a:latin typeface="Adobe Devanagari" panose="02040503050201020203" pitchFamily="18" charset="0"/>
+                <a:cs typeface="Adobe Devanagari" panose="02040503050201020203" pitchFamily="18" charset="0"/>
+              </a:rPr>
+              <a:t>AlertDialog</a:t>
+            </a:r>
+            <a:r>
+              <a:rPr lang="en-US" sz="3200" dirty="0">
+                <a:latin typeface="Adobe Devanagari" panose="02040503050201020203" pitchFamily="18" charset="0"/>
+                <a:cs typeface="Adobe Devanagari" panose="02040503050201020203" pitchFamily="18" charset="0"/>
+              </a:rPr>
+              <a:t> to interact with players</a:t>
+            </a:r>
+          </a:p>
+          <a:p>
+            <a:r>
+              <a:rPr lang="en-US" sz="3200" dirty="0">
+                <a:latin typeface="Adobe Devanagari" panose="02040503050201020203" pitchFamily="18" charset="0"/>
+                <a:cs typeface="Adobe Devanagari" panose="02040503050201020203" pitchFamily="18" charset="0"/>
+              </a:rPr>
+              <a:t>Notifications in case my content is not enough </a:t>
+            </a:r>
+          </a:p>
+          <a:p>
             <a:endParaRPr lang="en-US" dirty="0"/>
           </a:p>
         </p:txBody>
@@ -12579,7 +12739,7 @@
     </p:spTree>
     <p:extLst>
       <p:ext uri="{BB962C8B-B14F-4D97-AF65-F5344CB8AC3E}">
-        <p14:creationId xmlns:p14="http://schemas.microsoft.com/office/powerpoint/2010/main" val="66575749"/>
+        <p14:creationId xmlns:p14="http://schemas.microsoft.com/office/powerpoint/2010/main" val="713874807"/>
       </p:ext>
     </p:extLst>
   </p:cSld>
@@ -12703,7 +12863,7 @@
     </p:spTree>
     <p:extLst>
       <p:ext uri="{BB962C8B-B14F-4D97-AF65-F5344CB8AC3E}">
-        <p14:creationId xmlns:p14="http://schemas.microsoft.com/office/powerpoint/2010/main" val="1323956895"/>
+        <p14:creationId xmlns:p14="http://schemas.microsoft.com/office/powerpoint/2010/main" val="66575749"/>
       </p:ext>
     </p:extLst>
   </p:cSld>
@@ -12746,16 +12906,9 @@
             <p:ph type="title"/>
           </p:nvPr>
         </p:nvSpPr>
-        <p:spPr>
-          <a:xfrm>
-            <a:off x="1720469" y="605448"/>
-            <a:ext cx="9061010" cy="726519"/>
-          </a:xfrm>
-        </p:spPr>
-        <p:txBody>
-          <a:bodyPr>
-            <a:normAutofit/>
-          </a:bodyPr>
+        <p:spPr/>
+        <p:txBody>
+          <a:bodyPr/>
           <a:lstStyle/>
           <a:p>
             <a:r>
@@ -12772,114 +12925,69 @@
           </a:p>
         </p:txBody>
       </p:sp>
-      <p:pic>
-        <p:nvPicPr>
-          <p:cNvPr id="4" name="Picture 3">
+      <p:sp>
+        <p:nvSpPr>
+          <p:cNvPr id="3" name="Content Placeholder 2">
             <a:extLst>
               <a:ext uri="{FF2B5EF4-FFF2-40B4-BE49-F238E27FC236}">
-                <a16:creationId xmlns:a16="http://schemas.microsoft.com/office/drawing/2014/main" id="{B6F72FB9-12C4-474C-94D0-6581B6C28F82}"/>
+                <a16:creationId xmlns:a16="http://schemas.microsoft.com/office/drawing/2014/main" id="{AB89BAAB-295C-46E4-B19F-7080B14FC92B}"/>
               </a:ext>
             </a:extLst>
           </p:cNvPr>
-          <p:cNvPicPr>
-            <a:picLocks noChangeAspect="1"/>
-          </p:cNvPicPr>
-          <p:nvPr/>
-        </p:nvPicPr>
-        <p:blipFill>
-          <a:blip r:embed="rId2"/>
-          <a:stretch>
-            <a:fillRect/>
-          </a:stretch>
-        </p:blipFill>
-        <p:spPr>
-          <a:xfrm>
-            <a:off x="1720469" y="3210408"/>
-            <a:ext cx="7682940" cy="1012373"/>
-          </a:xfrm>
-          <a:prstGeom prst="rect">
-            <a:avLst/>
-          </a:prstGeom>
-        </p:spPr>
-      </p:pic>
-      <p:sp>
-        <p:nvSpPr>
-          <p:cNvPr id="5" name="TextBox 4">
-            <a:extLst>
-              <a:ext uri="{FF2B5EF4-FFF2-40B4-BE49-F238E27FC236}">
-                <a16:creationId xmlns:a16="http://schemas.microsoft.com/office/drawing/2014/main" id="{4EF13458-918B-479C-9167-62849C1FAA87}"/>
-              </a:ext>
-            </a:extLst>
-          </p:cNvPr>
-          <p:cNvSpPr txBox="1"/>
-          <p:nvPr/>
-        </p:nvSpPr>
-        <p:spPr>
-          <a:xfrm>
-            <a:off x="1720469" y="1331967"/>
-            <a:ext cx="8010759" cy="830997"/>
-          </a:xfrm>
-          <a:prstGeom prst="rect">
-            <a:avLst/>
-          </a:prstGeom>
-          <a:noFill/>
-        </p:spPr>
-        <p:txBody>
-          <a:bodyPr wrap="square" rtlCol="0">
-            <a:spAutoFit/>
-          </a:bodyPr>
+          <p:cNvSpPr>
+            <a:spLocks noGrp="1"/>
+          </p:cNvSpPr>
+          <p:nvPr>
+            <p:ph idx="1"/>
+          </p:nvPr>
+        </p:nvSpPr>
+        <p:spPr/>
+        <p:txBody>
+          <a:bodyPr/>
           <a:lstStyle/>
           <a:p>
             <a:r>
-              <a:rPr lang="en-US" sz="2400" dirty="0">
-                <a:latin typeface="Adobe Fan Heiti Std B" panose="020B0700000000000000" pitchFamily="34" charset="-128"/>
-                <a:ea typeface="Adobe Fan Heiti Std B" panose="020B0700000000000000" pitchFamily="34" charset="-128"/>
-              </a:rPr>
-              <a:t>Step 1: </a:t>
-            </a:r>
-            <a:r>
-              <a:rPr lang="en-US" sz="2400" dirty="0">
-                <a:latin typeface="Adobe Fan Heiti Std B" panose="020B0700000000000000" pitchFamily="34" charset="-128"/>
-                <a:ea typeface="Adobe Fan Heiti Std B" panose="020B0700000000000000" pitchFamily="34" charset="-128"/>
+              <a:rPr lang="en-US" sz="3200" dirty="0">
+                <a:latin typeface="Adobe Devanagari" panose="02040503050201020203" pitchFamily="18" charset="0"/>
                 <a:cs typeface="Adobe Devanagari" panose="02040503050201020203" pitchFamily="18" charset="0"/>
               </a:rPr>
-              <a:t>Customize my </a:t>
-            </a:r>
-            <a:r>
-              <a:rPr lang="en-US" sz="2400" dirty="0" err="1">
-                <a:latin typeface="Adobe Fan Heiti Std B" panose="020B0700000000000000" pitchFamily="34" charset="-128"/>
-                <a:ea typeface="Adobe Fan Heiti Std B" panose="020B0700000000000000" pitchFamily="34" charset="-128"/>
+              <a:t>Set the arrangement of components in the layout</a:t>
+            </a:r>
+          </a:p>
+          <a:p>
+            <a:r>
+              <a:rPr lang="en-US" sz="3200" dirty="0">
+                <a:latin typeface="Adobe Devanagari" panose="02040503050201020203" pitchFamily="18" charset="0"/>
                 <a:cs typeface="Adobe Devanagari" panose="02040503050201020203" pitchFamily="18" charset="0"/>
               </a:rPr>
-              <a:t>GameView</a:t>
-            </a:r>
-            <a:r>
-              <a:rPr lang="en-US" sz="2400" dirty="0">
-                <a:latin typeface="Adobe Fan Heiti Std B" panose="020B0700000000000000" pitchFamily="34" charset="-128"/>
-                <a:ea typeface="Adobe Fan Heiti Std B" panose="020B0700000000000000" pitchFamily="34" charset="-128"/>
+              <a:t>Customize how many rows and columns</a:t>
+            </a:r>
+          </a:p>
+          <a:p>
+            <a:r>
+              <a:rPr lang="en-US" sz="3200" dirty="0">
+                <a:latin typeface="Adobe Devanagari" panose="02040503050201020203" pitchFamily="18" charset="0"/>
                 <a:cs typeface="Adobe Devanagari" panose="02040503050201020203" pitchFamily="18" charset="0"/>
               </a:rPr>
-              <a:t> class which parent class is </a:t>
-            </a:r>
-            <a:r>
-              <a:rPr lang="en-US" sz="2400" dirty="0" err="1">
-                <a:latin typeface="Adobe Fan Heiti Std B" panose="020B0700000000000000" pitchFamily="34" charset="-128"/>
-                <a:ea typeface="Adobe Fan Heiti Std B" panose="020B0700000000000000" pitchFamily="34" charset="-128"/>
+              <a:t>Set the component to be in a row and column</a:t>
+            </a:r>
+          </a:p>
+          <a:p>
+            <a:r>
+              <a:rPr lang="en-US" sz="3200" dirty="0">
+                <a:latin typeface="Adobe Devanagari" panose="02040503050201020203" pitchFamily="18" charset="0"/>
                 <a:cs typeface="Adobe Devanagari" panose="02040503050201020203" pitchFamily="18" charset="0"/>
               </a:rPr>
-              <a:t>GridLayout</a:t>
-            </a:r>
-            <a:endParaRPr lang="en-US" sz="2400" dirty="0">
-              <a:latin typeface="Adobe Fan Heiti Std B" panose="020B0700000000000000" pitchFamily="34" charset="-128"/>
-              <a:ea typeface="Adobe Fan Heiti Std B" panose="020B0700000000000000" pitchFamily="34" charset="-128"/>
-            </a:endParaRPr>
+              <a:t>Set the component to span several rows or columns</a:t>
+            </a:r>
+            <a:endParaRPr lang="en-US" dirty="0"/>
           </a:p>
         </p:txBody>
       </p:sp>
     </p:spTree>
     <p:extLst>
       <p:ext uri="{BB962C8B-B14F-4D97-AF65-F5344CB8AC3E}">
-        <p14:creationId xmlns:p14="http://schemas.microsoft.com/office/powerpoint/2010/main" val="4131879529"/>
+        <p14:creationId xmlns:p14="http://schemas.microsoft.com/office/powerpoint/2010/main" val="1323956895"/>
       </p:ext>
     </p:extLst>
   </p:cSld>
@@ -12924,7 +13032,7 @@
         </p:nvSpPr>
         <p:spPr>
           <a:xfrm>
-            <a:off x="1720469" y="606986"/>
+            <a:off x="1720469" y="605448"/>
             <a:ext cx="9061010" cy="726519"/>
           </a:xfrm>
         </p:spPr>
@@ -12948,71 +13056,12 @@
           </a:p>
         </p:txBody>
       </p:sp>
-      <p:sp>
-        <p:nvSpPr>
-          <p:cNvPr id="5" name="TextBox 4">
+      <p:pic>
+        <p:nvPicPr>
+          <p:cNvPr id="4" name="Picture 3">
             <a:extLst>
               <a:ext uri="{FF2B5EF4-FFF2-40B4-BE49-F238E27FC236}">
-                <a16:creationId xmlns:a16="http://schemas.microsoft.com/office/drawing/2014/main" id="{4EF13458-918B-479C-9167-62849C1FAA87}"/>
-              </a:ext>
-            </a:extLst>
-          </p:cNvPr>
-          <p:cNvSpPr txBox="1"/>
-          <p:nvPr/>
-        </p:nvSpPr>
-        <p:spPr>
-          <a:xfrm>
-            <a:off x="1720469" y="1333505"/>
-            <a:ext cx="9210386" cy="830997"/>
-          </a:xfrm>
-          <a:prstGeom prst="rect">
-            <a:avLst/>
-          </a:prstGeom>
-          <a:noFill/>
-        </p:spPr>
-        <p:txBody>
-          <a:bodyPr wrap="square" rtlCol="0">
-            <a:spAutoFit/>
-          </a:bodyPr>
-          <a:lstStyle/>
-          <a:p>
-            <a:r>
-              <a:rPr lang="en-US" sz="2400" dirty="0">
-                <a:latin typeface="Adobe Fan Heiti Std B" panose="020B0700000000000000" pitchFamily="34" charset="-128"/>
-                <a:ea typeface="Adobe Fan Heiti Std B" panose="020B0700000000000000" pitchFamily="34" charset="-128"/>
-              </a:rPr>
-              <a:t>Step 2:  Create a initial method. </a:t>
-            </a:r>
-          </a:p>
-          <a:p>
-            <a:r>
-              <a:rPr lang="en-US" sz="2400" dirty="0">
-                <a:latin typeface="Adobe Fan Heiti Std B" panose="020B0700000000000000" pitchFamily="34" charset="-128"/>
-                <a:ea typeface="Adobe Fan Heiti Std B" panose="020B0700000000000000" pitchFamily="34" charset="-128"/>
-              </a:rPr>
-              <a:t>In this method, </a:t>
-            </a:r>
-            <a:r>
-              <a:rPr lang="en-US" sz="2400" dirty="0">
-                <a:latin typeface="Adobe Fan Heiti Std B" panose="020B0700000000000000" pitchFamily="34" charset="-128"/>
-                <a:ea typeface="Adobe Fan Heiti Std B" panose="020B0700000000000000" pitchFamily="34" charset="-128"/>
-                <a:cs typeface="Adobe Devanagari" panose="02040503050201020203" pitchFamily="18" charset="0"/>
-              </a:rPr>
-              <a:t>setting 4 columns and 4 rows for the game board. </a:t>
-            </a:r>
-            <a:endParaRPr lang="en-US" sz="2400" dirty="0">
-              <a:latin typeface="Adobe Fan Heiti Std B" panose="020B0700000000000000" pitchFamily="34" charset="-128"/>
-              <a:ea typeface="Adobe Fan Heiti Std B" panose="020B0700000000000000" pitchFamily="34" charset="-128"/>
-            </a:endParaRPr>
-          </a:p>
-        </p:txBody>
-      </p:sp>
-      <p:pic>
-        <p:nvPicPr>
-          <p:cNvPr id="6" name="Picture 5">
-            <a:extLst>
-              <a:ext uri="{FF2B5EF4-FFF2-40B4-BE49-F238E27FC236}">
-                <a16:creationId xmlns:a16="http://schemas.microsoft.com/office/drawing/2014/main" id="{5C548057-8D5F-41FD-B4BE-B18CAF398D19}"/>
+                <a16:creationId xmlns:a16="http://schemas.microsoft.com/office/drawing/2014/main" id="{B6F72FB9-12C4-474C-94D0-6581B6C28F82}"/>
               </a:ext>
             </a:extLst>
           </p:cNvPr>
@@ -13029,18 +13078,92 @@
         </p:blipFill>
         <p:spPr>
           <a:xfrm>
-            <a:off x="1720468" y="2948306"/>
-            <a:ext cx="7247679" cy="2603408"/>
+            <a:off x="1720469" y="3210408"/>
+            <a:ext cx="7682940" cy="1012373"/>
           </a:xfrm>
           <a:prstGeom prst="rect">
             <a:avLst/>
           </a:prstGeom>
         </p:spPr>
       </p:pic>
+      <p:sp>
+        <p:nvSpPr>
+          <p:cNvPr id="5" name="TextBox 4">
+            <a:extLst>
+              <a:ext uri="{FF2B5EF4-FFF2-40B4-BE49-F238E27FC236}">
+                <a16:creationId xmlns:a16="http://schemas.microsoft.com/office/drawing/2014/main" id="{4EF13458-918B-479C-9167-62849C1FAA87}"/>
+              </a:ext>
+            </a:extLst>
+          </p:cNvPr>
+          <p:cNvSpPr txBox="1"/>
+          <p:nvPr/>
+        </p:nvSpPr>
+        <p:spPr>
+          <a:xfrm>
+            <a:off x="1720469" y="1331967"/>
+            <a:ext cx="8010759" cy="830997"/>
+          </a:xfrm>
+          <a:prstGeom prst="rect">
+            <a:avLst/>
+          </a:prstGeom>
+          <a:noFill/>
+        </p:spPr>
+        <p:txBody>
+          <a:bodyPr wrap="square" rtlCol="0">
+            <a:spAutoFit/>
+          </a:bodyPr>
+          <a:lstStyle/>
+          <a:p>
+            <a:r>
+              <a:rPr lang="en-US" sz="2400" dirty="0">
+                <a:latin typeface="Adobe Fan Heiti Std B" panose="020B0700000000000000" pitchFamily="34" charset="-128"/>
+                <a:ea typeface="Adobe Fan Heiti Std B" panose="020B0700000000000000" pitchFamily="34" charset="-128"/>
+              </a:rPr>
+              <a:t>Step 1: </a:t>
+            </a:r>
+            <a:r>
+              <a:rPr lang="en-US" sz="2400" dirty="0">
+                <a:latin typeface="Adobe Fan Heiti Std B" panose="020B0700000000000000" pitchFamily="34" charset="-128"/>
+                <a:ea typeface="Adobe Fan Heiti Std B" panose="020B0700000000000000" pitchFamily="34" charset="-128"/>
+                <a:cs typeface="Adobe Devanagari" panose="02040503050201020203" pitchFamily="18" charset="0"/>
+              </a:rPr>
+              <a:t>Customize my </a:t>
+            </a:r>
+            <a:r>
+              <a:rPr lang="en-US" sz="2400" dirty="0" err="1">
+                <a:latin typeface="Adobe Fan Heiti Std B" panose="020B0700000000000000" pitchFamily="34" charset="-128"/>
+                <a:ea typeface="Adobe Fan Heiti Std B" panose="020B0700000000000000" pitchFamily="34" charset="-128"/>
+                <a:cs typeface="Adobe Devanagari" panose="02040503050201020203" pitchFamily="18" charset="0"/>
+              </a:rPr>
+              <a:t>GameView</a:t>
+            </a:r>
+            <a:r>
+              <a:rPr lang="en-US" sz="2400" dirty="0">
+                <a:latin typeface="Adobe Fan Heiti Std B" panose="020B0700000000000000" pitchFamily="34" charset="-128"/>
+                <a:ea typeface="Adobe Fan Heiti Std B" panose="020B0700000000000000" pitchFamily="34" charset="-128"/>
+                <a:cs typeface="Adobe Devanagari" panose="02040503050201020203" pitchFamily="18" charset="0"/>
+              </a:rPr>
+              <a:t> class which parent class is </a:t>
+            </a:r>
+            <a:r>
+              <a:rPr lang="en-US" sz="2400" dirty="0" err="1">
+                <a:latin typeface="Adobe Fan Heiti Std B" panose="020B0700000000000000" pitchFamily="34" charset="-128"/>
+                <a:ea typeface="Adobe Fan Heiti Std B" panose="020B0700000000000000" pitchFamily="34" charset="-128"/>
+                <a:cs typeface="Adobe Devanagari" panose="02040503050201020203" pitchFamily="18" charset="0"/>
+              </a:rPr>
+              <a:t>GridLayout</a:t>
+            </a:r>
+            <a:endParaRPr lang="en-US" sz="2400" dirty="0">
+              <a:latin typeface="Adobe Fan Heiti Std B" panose="020B0700000000000000" pitchFamily="34" charset="-128"/>
+              <a:ea typeface="Adobe Fan Heiti Std B" panose="020B0700000000000000" pitchFamily="34" charset="-128"/>
+            </a:endParaRPr>
+          </a:p>
+        </p:txBody>
+      </p:sp>
     </p:spTree>
     <p:extLst>
       <p:ext uri="{BB962C8B-B14F-4D97-AF65-F5344CB8AC3E}">
-        <p14:creationId xmlns:p14="http://schemas.microsoft.com/office/powerpoint/2010/main" val="1901440235"/>
+        <p14:creationId xmlns:p14="http://schemas.microsoft.com/office/powerpoint/2010/main" val="4131879529"/>
       </p:ext>
     </p:extLst>
   </p:cSld>
@@ -13124,7 +13247,7 @@
         <p:spPr>
           <a:xfrm>
             <a:off x="1720469" y="1333505"/>
-            <a:ext cx="8858048" cy="461665"/>
+            <a:ext cx="9210386" cy="830997"/>
           </a:xfrm>
           <a:prstGeom prst="rect">
             <a:avLst/>
@@ -13142,31 +13265,38 @@
                 <a:latin typeface="Adobe Fan Heiti Std B" panose="020B0700000000000000" pitchFamily="34" charset="-128"/>
                 <a:ea typeface="Adobe Fan Heiti Std B" panose="020B0700000000000000" pitchFamily="34" charset="-128"/>
               </a:rPr>
-              <a:t>Step 3:  override the </a:t>
-            </a:r>
-            <a:r>
-              <a:rPr lang="en-US" sz="2400" dirty="0" err="1">
-                <a:latin typeface="Adobe Fan Heiti Std B" panose="020B0700000000000000" pitchFamily="34" charset="-128"/>
-                <a:ea typeface="Adobe Fan Heiti Std B" panose="020B0700000000000000" pitchFamily="34" charset="-128"/>
-              </a:rPr>
-              <a:t>onTouch</a:t>
-            </a:r>
+              <a:t>Step 2:  Create a initial method. </a:t>
+            </a:r>
+          </a:p>
+          <a:p>
             <a:r>
               <a:rPr lang="en-US" sz="2400" dirty="0">
                 <a:latin typeface="Adobe Fan Heiti Std B" panose="020B0700000000000000" pitchFamily="34" charset="-128"/>
                 <a:ea typeface="Adobe Fan Heiti Std B" panose="020B0700000000000000" pitchFamily="34" charset="-128"/>
               </a:rPr>
-              <a:t>() method for swiping actions.</a:t>
-            </a:r>
+              <a:t>In this method, </a:t>
+            </a:r>
+            <a:r>
+              <a:rPr lang="en-US" sz="2400" dirty="0">
+                <a:latin typeface="Adobe Fan Heiti Std B" panose="020B0700000000000000" pitchFamily="34" charset="-128"/>
+                <a:ea typeface="Adobe Fan Heiti Std B" panose="020B0700000000000000" pitchFamily="34" charset="-128"/>
+                <a:cs typeface="Adobe Devanagari" panose="02040503050201020203" pitchFamily="18" charset="0"/>
+              </a:rPr>
+              <a:t>setting 4 columns and 4 rows for the game board. </a:t>
+            </a:r>
+            <a:endParaRPr lang="en-US" sz="2400" dirty="0">
+              <a:latin typeface="Adobe Fan Heiti Std B" panose="020B0700000000000000" pitchFamily="34" charset="-128"/>
+              <a:ea typeface="Adobe Fan Heiti Std B" panose="020B0700000000000000" pitchFamily="34" charset="-128"/>
+            </a:endParaRPr>
           </a:p>
         </p:txBody>
       </p:sp>
       <p:pic>
         <p:nvPicPr>
-          <p:cNvPr id="3" name="Picture 2">
+          <p:cNvPr id="6" name="Picture 5">
             <a:extLst>
               <a:ext uri="{FF2B5EF4-FFF2-40B4-BE49-F238E27FC236}">
-                <a16:creationId xmlns:a16="http://schemas.microsoft.com/office/drawing/2014/main" id="{B0C98589-7D5A-4940-A50C-DB8412F18F3C}"/>
+                <a16:creationId xmlns:a16="http://schemas.microsoft.com/office/drawing/2014/main" id="{5C548057-8D5F-41FD-B4BE-B18CAF398D19}"/>
               </a:ext>
             </a:extLst>
           </p:cNvPr>
@@ -13183,8 +13313,8 @@
         </p:blipFill>
         <p:spPr>
           <a:xfrm>
-            <a:off x="1720470" y="1932411"/>
-            <a:ext cx="4754976" cy="4737912"/>
+            <a:off x="1720468" y="2948306"/>
+            <a:ext cx="7247679" cy="2603408"/>
           </a:xfrm>
           <a:prstGeom prst="rect">
             <a:avLst/>
@@ -13194,7 +13324,7 @@
     </p:spTree>
     <p:extLst>
       <p:ext uri="{BB962C8B-B14F-4D97-AF65-F5344CB8AC3E}">
-        <p14:creationId xmlns:p14="http://schemas.microsoft.com/office/powerpoint/2010/main" val="11973239"/>
+        <p14:creationId xmlns:p14="http://schemas.microsoft.com/office/powerpoint/2010/main" val="1901440235"/>
       </p:ext>
     </p:extLst>
   </p:cSld>
@@ -13278,7 +13408,7 @@
         <p:spPr>
           <a:xfrm>
             <a:off x="1720469" y="1333505"/>
-            <a:ext cx="8858048" cy="830997"/>
+            <a:ext cx="8858048" cy="461665"/>
           </a:xfrm>
           <a:prstGeom prst="rect">
             <a:avLst/>
@@ -13296,45 +13426,31 @@
                 <a:latin typeface="Adobe Fan Heiti Std B" panose="020B0700000000000000" pitchFamily="34" charset="-128"/>
                 <a:ea typeface="Adobe Fan Heiti Std B" panose="020B0700000000000000" pitchFamily="34" charset="-128"/>
               </a:rPr>
-              <a:t>Step 4:  override </a:t>
+              <a:t>Step 3:  override the </a:t>
             </a:r>
             <a:r>
               <a:rPr lang="en-US" sz="2400" dirty="0" err="1">
                 <a:latin typeface="Adobe Fan Heiti Std B" panose="020B0700000000000000" pitchFamily="34" charset="-128"/>
                 <a:ea typeface="Adobe Fan Heiti Std B" panose="020B0700000000000000" pitchFamily="34" charset="-128"/>
               </a:rPr>
-              <a:t>onSizeChanged</a:t>
+              <a:t>onTouch</a:t>
             </a:r>
             <a:r>
               <a:rPr lang="en-US" sz="2400" dirty="0">
                 <a:latin typeface="Adobe Fan Heiti Std B" panose="020B0700000000000000" pitchFamily="34" charset="-128"/>
                 <a:ea typeface="Adobe Fan Heiti Std B" panose="020B0700000000000000" pitchFamily="34" charset="-128"/>
               </a:rPr>
-              <a:t>() method to create 16 Cards (Card class is child of </a:t>
-            </a:r>
-            <a:r>
-              <a:rPr lang="en-US" sz="2400" dirty="0" err="1">
-                <a:latin typeface="Adobe Fan Heiti Std B" panose="020B0700000000000000" pitchFamily="34" charset="-128"/>
-                <a:ea typeface="Adobe Fan Heiti Std B" panose="020B0700000000000000" pitchFamily="34" charset="-128"/>
-              </a:rPr>
-              <a:t>FrameLayout</a:t>
-            </a:r>
-            <a:r>
-              <a:rPr lang="en-US" sz="2400" dirty="0">
-                <a:latin typeface="Adobe Fan Heiti Std B" panose="020B0700000000000000" pitchFamily="34" charset="-128"/>
-                <a:ea typeface="Adobe Fan Heiti Std B" panose="020B0700000000000000" pitchFamily="34" charset="-128"/>
-              </a:rPr>
-              <a:t>)</a:t>
+              <a:t>() method for swiping actions.</a:t>
             </a:r>
           </a:p>
         </p:txBody>
       </p:sp>
       <p:pic>
         <p:nvPicPr>
-          <p:cNvPr id="4" name="Picture 3">
+          <p:cNvPr id="3" name="Picture 2">
             <a:extLst>
               <a:ext uri="{FF2B5EF4-FFF2-40B4-BE49-F238E27FC236}">
-                <a16:creationId xmlns:a16="http://schemas.microsoft.com/office/drawing/2014/main" id="{A46CA978-08AA-453B-A48C-184FBB0333D0}"/>
+                <a16:creationId xmlns:a16="http://schemas.microsoft.com/office/drawing/2014/main" id="{B0C98589-7D5A-4940-A50C-DB8412F18F3C}"/>
               </a:ext>
             </a:extLst>
           </p:cNvPr>
@@ -13351,180 +13467,18 @@
         </p:blipFill>
         <p:spPr>
           <a:xfrm>
-            <a:off x="1720468" y="2481943"/>
-            <a:ext cx="7290619" cy="2270507"/>
+            <a:off x="1720470" y="1932411"/>
+            <a:ext cx="4754976" cy="4737912"/>
           </a:xfrm>
           <a:prstGeom prst="rect">
             <a:avLst/>
           </a:prstGeom>
         </p:spPr>
       </p:pic>
-      <p:sp>
-        <p:nvSpPr>
-          <p:cNvPr id="6" name="TextBox 5">
-            <a:extLst>
-              <a:ext uri="{FF2B5EF4-FFF2-40B4-BE49-F238E27FC236}">
-                <a16:creationId xmlns:a16="http://schemas.microsoft.com/office/drawing/2014/main" id="{BE9A3118-4FF6-4B4A-9FD7-C1DEF84E7523}"/>
-              </a:ext>
-            </a:extLst>
-          </p:cNvPr>
-          <p:cNvSpPr txBox="1"/>
-          <p:nvPr/>
-        </p:nvSpPr>
-        <p:spPr>
-          <a:xfrm>
-            <a:off x="1720468" y="5133805"/>
-            <a:ext cx="9479902" cy="1046440"/>
-          </a:xfrm>
-          <a:prstGeom prst="rect">
-            <a:avLst/>
-          </a:prstGeom>
-          <a:noFill/>
-        </p:spPr>
-        <p:txBody>
-          <a:bodyPr wrap="square" rtlCol="0">
-            <a:spAutoFit/>
-          </a:bodyPr>
-          <a:lstStyle/>
-          <a:p>
-            <a:r>
-              <a:rPr lang="en-US" sz="2400" dirty="0">
-                <a:solidFill>
-                  <a:schemeClr val="bg1">
-                    <a:lumMod val="50000"/>
-                  </a:schemeClr>
-                </a:solidFill>
-                <a:latin typeface="Adobe Fan Heiti Std B" panose="020B0700000000000000" pitchFamily="34" charset="-128"/>
-                <a:ea typeface="Adobe Fan Heiti Std B" panose="020B0700000000000000" pitchFamily="34" charset="-128"/>
-              </a:rPr>
-              <a:t>Tips: the View Lifecycle</a:t>
-            </a:r>
-          </a:p>
-          <a:p>
-            <a:endParaRPr lang="en-US" dirty="0">
-              <a:solidFill>
-                <a:schemeClr val="bg1">
-                  <a:lumMod val="50000"/>
-                </a:schemeClr>
-              </a:solidFill>
-            </a:endParaRPr>
-          </a:p>
-          <a:p>
-            <a:r>
-              <a:rPr lang="en-US" sz="2000" dirty="0">
-                <a:solidFill>
-                  <a:schemeClr val="bg1">
-                    <a:lumMod val="50000"/>
-                  </a:schemeClr>
-                </a:solidFill>
-                <a:latin typeface="Adobe Fan Heiti Std B" panose="020B0700000000000000" pitchFamily="34" charset="-128"/>
-                <a:ea typeface="Adobe Fan Heiti Std B" panose="020B0700000000000000" pitchFamily="34" charset="-128"/>
-              </a:rPr>
-              <a:t>View() --&gt; </a:t>
-            </a:r>
-            <a:r>
-              <a:rPr lang="en-US" sz="2000" dirty="0" err="1">
-                <a:solidFill>
-                  <a:schemeClr val="bg1">
-                    <a:lumMod val="50000"/>
-                  </a:schemeClr>
-                </a:solidFill>
-                <a:latin typeface="Adobe Fan Heiti Std B" panose="020B0700000000000000" pitchFamily="34" charset="-128"/>
-                <a:ea typeface="Adobe Fan Heiti Std B" panose="020B0700000000000000" pitchFamily="34" charset="-128"/>
-              </a:rPr>
-              <a:t>onMeasure</a:t>
-            </a:r>
-            <a:r>
-              <a:rPr lang="en-US" sz="2000" dirty="0">
-                <a:solidFill>
-                  <a:schemeClr val="bg1">
-                    <a:lumMod val="50000"/>
-                  </a:schemeClr>
-                </a:solidFill>
-                <a:latin typeface="Adobe Fan Heiti Std B" panose="020B0700000000000000" pitchFamily="34" charset="-128"/>
-                <a:ea typeface="Adobe Fan Heiti Std B" panose="020B0700000000000000" pitchFamily="34" charset="-128"/>
-              </a:rPr>
-              <a:t>() --&gt; </a:t>
-            </a:r>
-            <a:r>
-              <a:rPr lang="en-US" sz="2000" dirty="0" err="1">
-                <a:solidFill>
-                  <a:schemeClr val="bg1">
-                    <a:lumMod val="50000"/>
-                  </a:schemeClr>
-                </a:solidFill>
-                <a:latin typeface="Adobe Fan Heiti Std B" panose="020B0700000000000000" pitchFamily="34" charset="-128"/>
-                <a:ea typeface="Adobe Fan Heiti Std B" panose="020B0700000000000000" pitchFamily="34" charset="-128"/>
-              </a:rPr>
-              <a:t>onSizeChanged</a:t>
-            </a:r>
-            <a:r>
-              <a:rPr lang="en-US" sz="2000" dirty="0">
-                <a:solidFill>
-                  <a:schemeClr val="bg1">
-                    <a:lumMod val="50000"/>
-                  </a:schemeClr>
-                </a:solidFill>
-                <a:latin typeface="Adobe Fan Heiti Std B" panose="020B0700000000000000" pitchFamily="34" charset="-128"/>
-                <a:ea typeface="Adobe Fan Heiti Std B" panose="020B0700000000000000" pitchFamily="34" charset="-128"/>
-              </a:rPr>
-              <a:t>() --&gt; </a:t>
-            </a:r>
-            <a:r>
-              <a:rPr lang="en-US" sz="2000" dirty="0" err="1">
-                <a:solidFill>
-                  <a:schemeClr val="bg1">
-                    <a:lumMod val="50000"/>
-                  </a:schemeClr>
-                </a:solidFill>
-                <a:latin typeface="Adobe Fan Heiti Std B" panose="020B0700000000000000" pitchFamily="34" charset="-128"/>
-                <a:ea typeface="Adobe Fan Heiti Std B" panose="020B0700000000000000" pitchFamily="34" charset="-128"/>
-              </a:rPr>
-              <a:t>onLayout</a:t>
-            </a:r>
-            <a:r>
-              <a:rPr lang="en-US" sz="2000" dirty="0">
-                <a:solidFill>
-                  <a:schemeClr val="bg1">
-                    <a:lumMod val="50000"/>
-                  </a:schemeClr>
-                </a:solidFill>
-                <a:latin typeface="Adobe Fan Heiti Std B" panose="020B0700000000000000" pitchFamily="34" charset="-128"/>
-                <a:ea typeface="Adobe Fan Heiti Std B" panose="020B0700000000000000" pitchFamily="34" charset="-128"/>
-              </a:rPr>
-              <a:t>() --&gt; </a:t>
-            </a:r>
-            <a:r>
-              <a:rPr lang="en-US" sz="2000" dirty="0" err="1">
-                <a:solidFill>
-                  <a:schemeClr val="bg1">
-                    <a:lumMod val="50000"/>
-                  </a:schemeClr>
-                </a:solidFill>
-                <a:latin typeface="Adobe Fan Heiti Std B" panose="020B0700000000000000" pitchFamily="34" charset="-128"/>
-                <a:ea typeface="Adobe Fan Heiti Std B" panose="020B0700000000000000" pitchFamily="34" charset="-128"/>
-              </a:rPr>
-              <a:t>onDraw</a:t>
-            </a:r>
-            <a:r>
-              <a:rPr lang="en-US" sz="2000" dirty="0">
-                <a:solidFill>
-                  <a:schemeClr val="bg1">
-                    <a:lumMod val="50000"/>
-                  </a:schemeClr>
-                </a:solidFill>
-                <a:latin typeface="Adobe Fan Heiti Std B" panose="020B0700000000000000" pitchFamily="34" charset="-128"/>
-                <a:ea typeface="Adobe Fan Heiti Std B" panose="020B0700000000000000" pitchFamily="34" charset="-128"/>
-              </a:rPr>
-              <a:t>()</a:t>
-            </a:r>
-          </a:p>
-        </p:txBody>
-      </p:sp>
     </p:spTree>
     <p:extLst>
       <p:ext uri="{BB962C8B-B14F-4D97-AF65-F5344CB8AC3E}">
-        <p14:creationId xmlns:p14="http://schemas.microsoft.com/office/powerpoint/2010/main" val="3565572068"/>
+        <p14:creationId xmlns:p14="http://schemas.microsoft.com/office/powerpoint/2010/main" val="11973239"/>
       </p:ext>
     </p:extLst>
   </p:cSld>
@@ -13607,8 +13561,8 @@
         </p:nvSpPr>
         <p:spPr>
           <a:xfrm>
-            <a:off x="1720468" y="2323405"/>
-            <a:ext cx="8858048" cy="1200329"/>
+            <a:off x="1720469" y="1333505"/>
+            <a:ext cx="8858048" cy="830997"/>
           </a:xfrm>
           <a:prstGeom prst="rect">
             <a:avLst/>
@@ -13626,7 +13580,227 @@
                 <a:latin typeface="Adobe Fan Heiti Std B" panose="020B0700000000000000" pitchFamily="34" charset="-128"/>
                 <a:ea typeface="Adobe Fan Heiti Std B" panose="020B0700000000000000" pitchFamily="34" charset="-128"/>
               </a:rPr>
-              <a:t>Step 5:  The logic of the game is implemented in this class. Due to limited time, if you are interested in game logic, you can look at the code.</a:t>
+              <a:t>Step 4:  override </a:t>
+            </a:r>
+            <a:r>
+              <a:rPr lang="en-US" sz="2400" dirty="0" err="1">
+                <a:latin typeface="Adobe Fan Heiti Std B" panose="020B0700000000000000" pitchFamily="34" charset="-128"/>
+                <a:ea typeface="Adobe Fan Heiti Std B" panose="020B0700000000000000" pitchFamily="34" charset="-128"/>
+              </a:rPr>
+              <a:t>onSizeChanged</a:t>
+            </a:r>
+            <a:r>
+              <a:rPr lang="en-US" sz="2400" dirty="0">
+                <a:latin typeface="Adobe Fan Heiti Std B" panose="020B0700000000000000" pitchFamily="34" charset="-128"/>
+                <a:ea typeface="Adobe Fan Heiti Std B" panose="020B0700000000000000" pitchFamily="34" charset="-128"/>
+              </a:rPr>
+              <a:t>() method to create 16 Cards (Card class is child of </a:t>
+            </a:r>
+            <a:r>
+              <a:rPr lang="en-US" sz="2400" dirty="0" err="1">
+                <a:latin typeface="Adobe Fan Heiti Std B" panose="020B0700000000000000" pitchFamily="34" charset="-128"/>
+                <a:ea typeface="Adobe Fan Heiti Std B" panose="020B0700000000000000" pitchFamily="34" charset="-128"/>
+              </a:rPr>
+              <a:t>FrameLayout</a:t>
+            </a:r>
+            <a:r>
+              <a:rPr lang="en-US" sz="2400" dirty="0">
+                <a:latin typeface="Adobe Fan Heiti Std B" panose="020B0700000000000000" pitchFamily="34" charset="-128"/>
+                <a:ea typeface="Adobe Fan Heiti Std B" panose="020B0700000000000000" pitchFamily="34" charset="-128"/>
+              </a:rPr>
+              <a:t>)</a:t>
+            </a:r>
+          </a:p>
+        </p:txBody>
+      </p:sp>
+      <p:pic>
+        <p:nvPicPr>
+          <p:cNvPr id="4" name="Picture 3">
+            <a:extLst>
+              <a:ext uri="{FF2B5EF4-FFF2-40B4-BE49-F238E27FC236}">
+                <a16:creationId xmlns:a16="http://schemas.microsoft.com/office/drawing/2014/main" id="{A46CA978-08AA-453B-A48C-184FBB0333D0}"/>
+              </a:ext>
+            </a:extLst>
+          </p:cNvPr>
+          <p:cNvPicPr>
+            <a:picLocks noChangeAspect="1"/>
+          </p:cNvPicPr>
+          <p:nvPr/>
+        </p:nvPicPr>
+        <p:blipFill>
+          <a:blip r:embed="rId2"/>
+          <a:stretch>
+            <a:fillRect/>
+          </a:stretch>
+        </p:blipFill>
+        <p:spPr>
+          <a:xfrm>
+            <a:off x="1720468" y="2481943"/>
+            <a:ext cx="7290619" cy="2270507"/>
+          </a:xfrm>
+          <a:prstGeom prst="rect">
+            <a:avLst/>
+          </a:prstGeom>
+        </p:spPr>
+      </p:pic>
+      <p:sp>
+        <p:nvSpPr>
+          <p:cNvPr id="6" name="TextBox 5">
+            <a:extLst>
+              <a:ext uri="{FF2B5EF4-FFF2-40B4-BE49-F238E27FC236}">
+                <a16:creationId xmlns:a16="http://schemas.microsoft.com/office/drawing/2014/main" id="{BE9A3118-4FF6-4B4A-9FD7-C1DEF84E7523}"/>
+              </a:ext>
+            </a:extLst>
+          </p:cNvPr>
+          <p:cNvSpPr txBox="1"/>
+          <p:nvPr/>
+        </p:nvSpPr>
+        <p:spPr>
+          <a:xfrm>
+            <a:off x="1720468" y="5133805"/>
+            <a:ext cx="9479902" cy="1046440"/>
+          </a:xfrm>
+          <a:prstGeom prst="rect">
+            <a:avLst/>
+          </a:prstGeom>
+          <a:noFill/>
+        </p:spPr>
+        <p:txBody>
+          <a:bodyPr wrap="square" rtlCol="0">
+            <a:spAutoFit/>
+          </a:bodyPr>
+          <a:lstStyle/>
+          <a:p>
+            <a:r>
+              <a:rPr lang="en-US" sz="2400" dirty="0">
+                <a:solidFill>
+                  <a:schemeClr val="bg1">
+                    <a:lumMod val="50000"/>
+                  </a:schemeClr>
+                </a:solidFill>
+                <a:latin typeface="Adobe Fan Heiti Std B" panose="020B0700000000000000" pitchFamily="34" charset="-128"/>
+                <a:ea typeface="Adobe Fan Heiti Std B" panose="020B0700000000000000" pitchFamily="34" charset="-128"/>
+              </a:rPr>
+              <a:t>Tips: the View Lifecycle</a:t>
+            </a:r>
+          </a:p>
+          <a:p>
+            <a:endParaRPr lang="en-US" dirty="0">
+              <a:solidFill>
+                <a:schemeClr val="bg1">
+                  <a:lumMod val="50000"/>
+                </a:schemeClr>
+              </a:solidFill>
+            </a:endParaRPr>
+          </a:p>
+          <a:p>
+            <a:r>
+              <a:rPr lang="en-US" sz="2000" dirty="0">
+                <a:solidFill>
+                  <a:schemeClr val="bg1">
+                    <a:lumMod val="50000"/>
+                  </a:schemeClr>
+                </a:solidFill>
+                <a:latin typeface="Adobe Fan Heiti Std B" panose="020B0700000000000000" pitchFamily="34" charset="-128"/>
+                <a:ea typeface="Adobe Fan Heiti Std B" panose="020B0700000000000000" pitchFamily="34" charset="-128"/>
+              </a:rPr>
+              <a:t>View() --&gt; </a:t>
+            </a:r>
+            <a:r>
+              <a:rPr lang="en-US" sz="2000" dirty="0" err="1">
+                <a:solidFill>
+                  <a:schemeClr val="bg1">
+                    <a:lumMod val="50000"/>
+                  </a:schemeClr>
+                </a:solidFill>
+                <a:latin typeface="Adobe Fan Heiti Std B" panose="020B0700000000000000" pitchFamily="34" charset="-128"/>
+                <a:ea typeface="Adobe Fan Heiti Std B" panose="020B0700000000000000" pitchFamily="34" charset="-128"/>
+              </a:rPr>
+              <a:t>onMeasure</a:t>
+            </a:r>
+            <a:r>
+              <a:rPr lang="en-US" sz="2000" dirty="0">
+                <a:solidFill>
+                  <a:schemeClr val="bg1">
+                    <a:lumMod val="50000"/>
+                  </a:schemeClr>
+                </a:solidFill>
+                <a:latin typeface="Adobe Fan Heiti Std B" panose="020B0700000000000000" pitchFamily="34" charset="-128"/>
+                <a:ea typeface="Adobe Fan Heiti Std B" panose="020B0700000000000000" pitchFamily="34" charset="-128"/>
+              </a:rPr>
+              <a:t>() --&gt; </a:t>
+            </a:r>
+            <a:r>
+              <a:rPr lang="en-US" sz="2000" dirty="0" err="1">
+                <a:solidFill>
+                  <a:schemeClr val="bg1">
+                    <a:lumMod val="50000"/>
+                  </a:schemeClr>
+                </a:solidFill>
+                <a:latin typeface="Adobe Fan Heiti Std B" panose="020B0700000000000000" pitchFamily="34" charset="-128"/>
+                <a:ea typeface="Adobe Fan Heiti Std B" panose="020B0700000000000000" pitchFamily="34" charset="-128"/>
+              </a:rPr>
+              <a:t>onSizeChanged</a:t>
+            </a:r>
+            <a:r>
+              <a:rPr lang="en-US" sz="2000" dirty="0">
+                <a:solidFill>
+                  <a:schemeClr val="bg1">
+                    <a:lumMod val="50000"/>
+                  </a:schemeClr>
+                </a:solidFill>
+                <a:latin typeface="Adobe Fan Heiti Std B" panose="020B0700000000000000" pitchFamily="34" charset="-128"/>
+                <a:ea typeface="Adobe Fan Heiti Std B" panose="020B0700000000000000" pitchFamily="34" charset="-128"/>
+              </a:rPr>
+              <a:t>() --&gt; </a:t>
+            </a:r>
+            <a:r>
+              <a:rPr lang="en-US" sz="2000" dirty="0" err="1">
+                <a:solidFill>
+                  <a:schemeClr val="bg1">
+                    <a:lumMod val="50000"/>
+                  </a:schemeClr>
+                </a:solidFill>
+                <a:latin typeface="Adobe Fan Heiti Std B" panose="020B0700000000000000" pitchFamily="34" charset="-128"/>
+                <a:ea typeface="Adobe Fan Heiti Std B" panose="020B0700000000000000" pitchFamily="34" charset="-128"/>
+              </a:rPr>
+              <a:t>onLayout</a:t>
+            </a:r>
+            <a:r>
+              <a:rPr lang="en-US" sz="2000" dirty="0">
+                <a:solidFill>
+                  <a:schemeClr val="bg1">
+                    <a:lumMod val="50000"/>
+                  </a:schemeClr>
+                </a:solidFill>
+                <a:latin typeface="Adobe Fan Heiti Std B" panose="020B0700000000000000" pitchFamily="34" charset="-128"/>
+                <a:ea typeface="Adobe Fan Heiti Std B" panose="020B0700000000000000" pitchFamily="34" charset="-128"/>
+              </a:rPr>
+              <a:t>() --&gt; </a:t>
+            </a:r>
+            <a:r>
+              <a:rPr lang="en-US" sz="2000" dirty="0" err="1">
+                <a:solidFill>
+                  <a:schemeClr val="bg1">
+                    <a:lumMod val="50000"/>
+                  </a:schemeClr>
+                </a:solidFill>
+                <a:latin typeface="Adobe Fan Heiti Std B" panose="020B0700000000000000" pitchFamily="34" charset="-128"/>
+                <a:ea typeface="Adobe Fan Heiti Std B" panose="020B0700000000000000" pitchFamily="34" charset="-128"/>
+              </a:rPr>
+              <a:t>onDraw</a:t>
+            </a:r>
+            <a:r>
+              <a:rPr lang="en-US" sz="2000" dirty="0">
+                <a:solidFill>
+                  <a:schemeClr val="bg1">
+                    <a:lumMod val="50000"/>
+                  </a:schemeClr>
+                </a:solidFill>
+                <a:latin typeface="Adobe Fan Heiti Std B" panose="020B0700000000000000" pitchFamily="34" charset="-128"/>
+                <a:ea typeface="Adobe Fan Heiti Std B" panose="020B0700000000000000" pitchFamily="34" charset="-128"/>
+              </a:rPr>
+              <a:t>()</a:t>
             </a:r>
           </a:p>
         </p:txBody>
@@ -13634,7 +13808,7 @@
     </p:spTree>
     <p:extLst>
       <p:ext uri="{BB962C8B-B14F-4D97-AF65-F5344CB8AC3E}">
-        <p14:creationId xmlns:p14="http://schemas.microsoft.com/office/powerpoint/2010/main" val="3170536687"/>
+        <p14:creationId xmlns:p14="http://schemas.microsoft.com/office/powerpoint/2010/main" val="3565572068"/>
       </p:ext>
     </p:extLst>
   </p:cSld>

</xml_diff>